<commit_message>
Update the data analysis (09.01.2024), update the presentation and README
</commit_message>
<xml_diff>
--- a/Presentation.pptx
+++ b/Presentation.pptx
@@ -42,10 +42,13 @@
     <p:sldId id="291" r:id="rId36"/>
     <p:sldId id="292" r:id="rId37"/>
     <p:sldId id="293" r:id="rId38"/>
-    <p:sldId id="294" r:id="rId39"/>
-    <p:sldId id="295" r:id="rId40"/>
-    <p:sldId id="296" r:id="rId41"/>
-    <p:sldId id="263" r:id="rId42"/>
+    <p:sldId id="297" r:id="rId39"/>
+    <p:sldId id="298" r:id="rId40"/>
+    <p:sldId id="299" r:id="rId41"/>
+    <p:sldId id="294" r:id="rId42"/>
+    <p:sldId id="295" r:id="rId43"/>
+    <p:sldId id="296" r:id="rId44"/>
+    <p:sldId id="263" r:id="rId45"/>
   </p:sldIdLst>
   <p:sldSz cx="12192000" cy="6858000"/>
   <p:notesSz cx="6858000" cy="9144000"/>
@@ -301,7 +304,7 @@
           <a:p>
             <a:fld id="{99997887-B41C-4EB6-9580-B05F768365B2}" type="datetimeFigureOut">
               <a:rPr lang="en-US" smtClean="0"/>
-              <a:t>12/16/2023</a:t>
+              <a:t>1/9/2024</a:t>
             </a:fld>
             <a:endParaRPr lang="en-US"/>
           </a:p>
@@ -501,7 +504,7 @@
           <a:p>
             <a:fld id="{99997887-B41C-4EB6-9580-B05F768365B2}" type="datetimeFigureOut">
               <a:rPr lang="en-US" smtClean="0"/>
-              <a:t>12/16/2023</a:t>
+              <a:t>1/9/2024</a:t>
             </a:fld>
             <a:endParaRPr lang="en-US"/>
           </a:p>
@@ -711,7 +714,7 @@
           <a:p>
             <a:fld id="{99997887-B41C-4EB6-9580-B05F768365B2}" type="datetimeFigureOut">
               <a:rPr lang="en-US" smtClean="0"/>
-              <a:t>12/16/2023</a:t>
+              <a:t>1/9/2024</a:t>
             </a:fld>
             <a:endParaRPr lang="en-US"/>
           </a:p>
@@ -911,7 +914,7 @@
           <a:p>
             <a:fld id="{99997887-B41C-4EB6-9580-B05F768365B2}" type="datetimeFigureOut">
               <a:rPr lang="en-US" smtClean="0"/>
-              <a:t>12/16/2023</a:t>
+              <a:t>1/9/2024</a:t>
             </a:fld>
             <a:endParaRPr lang="en-US"/>
           </a:p>
@@ -1187,7 +1190,7 @@
           <a:p>
             <a:fld id="{99997887-B41C-4EB6-9580-B05F768365B2}" type="datetimeFigureOut">
               <a:rPr lang="en-US" smtClean="0"/>
-              <a:t>12/16/2023</a:t>
+              <a:t>1/9/2024</a:t>
             </a:fld>
             <a:endParaRPr lang="en-US"/>
           </a:p>
@@ -1455,7 +1458,7 @@
           <a:p>
             <a:fld id="{99997887-B41C-4EB6-9580-B05F768365B2}" type="datetimeFigureOut">
               <a:rPr lang="en-US" smtClean="0"/>
-              <a:t>12/16/2023</a:t>
+              <a:t>1/9/2024</a:t>
             </a:fld>
             <a:endParaRPr lang="en-US"/>
           </a:p>
@@ -1870,7 +1873,7 @@
           <a:p>
             <a:fld id="{99997887-B41C-4EB6-9580-B05F768365B2}" type="datetimeFigureOut">
               <a:rPr lang="en-US" smtClean="0"/>
-              <a:t>12/16/2023</a:t>
+              <a:t>1/9/2024</a:t>
             </a:fld>
             <a:endParaRPr lang="en-US"/>
           </a:p>
@@ -2012,7 +2015,7 @@
           <a:p>
             <a:fld id="{99997887-B41C-4EB6-9580-B05F768365B2}" type="datetimeFigureOut">
               <a:rPr lang="en-US" smtClean="0"/>
-              <a:t>12/16/2023</a:t>
+              <a:t>1/9/2024</a:t>
             </a:fld>
             <a:endParaRPr lang="en-US"/>
           </a:p>
@@ -2125,7 +2128,7 @@
           <a:p>
             <a:fld id="{99997887-B41C-4EB6-9580-B05F768365B2}" type="datetimeFigureOut">
               <a:rPr lang="en-US" smtClean="0"/>
-              <a:t>12/16/2023</a:t>
+              <a:t>1/9/2024</a:t>
             </a:fld>
             <a:endParaRPr lang="en-US"/>
           </a:p>
@@ -2438,7 +2441,7 @@
           <a:p>
             <a:fld id="{99997887-B41C-4EB6-9580-B05F768365B2}" type="datetimeFigureOut">
               <a:rPr lang="en-US" smtClean="0"/>
-              <a:t>12/16/2023</a:t>
+              <a:t>1/9/2024</a:t>
             </a:fld>
             <a:endParaRPr lang="en-US"/>
           </a:p>
@@ -2727,7 +2730,7 @@
           <a:p>
             <a:fld id="{99997887-B41C-4EB6-9580-B05F768365B2}" type="datetimeFigureOut">
               <a:rPr lang="en-US" smtClean="0"/>
-              <a:t>12/16/2023</a:t>
+              <a:t>1/9/2024</a:t>
             </a:fld>
             <a:endParaRPr lang="en-US"/>
           </a:p>
@@ -2979,7 +2982,7 @@
           <a:p>
             <a:fld id="{99997887-B41C-4EB6-9580-B05F768365B2}" type="datetimeFigureOut">
               <a:rPr lang="en-US" smtClean="0"/>
-              <a:t>12/16/2023</a:t>
+              <a:t>1/9/2024</a:t>
             </a:fld>
             <a:endParaRPr lang="en-US"/>
           </a:p>
@@ -3417,6 +3420,28 @@
           <a:bodyPr/>
           <a:lstStyle/>
           <a:p>
+            <a:r>
+              <a:rPr lang="en-DE" sz="2400" b="1" i="0" cap="none" spc="0" dirty="0">
+                <a:ln w="10160">
+                  <a:solidFill>
+                    <a:schemeClr val="tx1"/>
+                  </a:solidFill>
+                  <a:prstDash val="solid"/>
+                </a:ln>
+                <a:solidFill>
+                  <a:srgbClr val="FFFFFF"/>
+                </a:solidFill>
+                <a:effectLst>
+                  <a:outerShdw blurRad="38100" dist="22860" dir="5400000" algn="tl" rotWithShape="0">
+                    <a:srgbClr val="000000">
+                      <a:alpha val="30000"/>
+                    </a:srgbClr>
+                  </a:outerShdw>
+                </a:effectLst>
+                <a:latin typeface="Roboto" panose="020F0502020204030204" pitchFamily="2" charset="0"/>
+              </a:rPr>
+              <a:t>(Stand der Analyse: 09.01.2024)</a:t>
+            </a:r>
             <a:endParaRPr lang="en-US" dirty="0"/>
           </a:p>
         </p:txBody>
@@ -3761,16 +3786,19 @@
           <a:bodyPr/>
           <a:lstStyle/>
           <a:p>
+            <a:pPr marL="0" indent="0">
+              <a:buNone/>
+            </a:pPr>
             <a:endParaRPr lang="en-US" dirty="0"/>
           </a:p>
         </p:txBody>
       </p:sp>
       <p:pic>
         <p:nvPicPr>
-          <p:cNvPr id="6" name="Grafik 5">
+          <p:cNvPr id="8" name="Grafik 7">
             <a:extLst>
               <a:ext uri="{FF2B5EF4-FFF2-40B4-BE49-F238E27FC236}">
-                <a16:creationId xmlns:a16="http://schemas.microsoft.com/office/drawing/2014/main" id="{6AB743FD-7C11-2C91-8692-64ECAA34A98B}"/>
+                <a16:creationId xmlns:a16="http://schemas.microsoft.com/office/drawing/2014/main" id="{06157D0F-28D6-444A-F06F-341E279B0220}"/>
               </a:ext>
             </a:extLst>
           </p:cNvPr>
@@ -3787,8 +3815,8 @@
         </p:blipFill>
         <p:spPr>
           <a:xfrm>
-            <a:off x="3688057" y="1434494"/>
-            <a:ext cx="4815885" cy="5133600"/>
+            <a:off x="3695875" y="1434494"/>
+            <a:ext cx="4800249" cy="5133600"/>
           </a:xfrm>
           <a:prstGeom prst="rect">
             <a:avLst/>
@@ -3943,10 +3971,10 @@
       </p:sp>
       <p:pic>
         <p:nvPicPr>
-          <p:cNvPr id="6" name="Grafik 5">
+          <p:cNvPr id="5" name="Grafik 4">
             <a:extLst>
               <a:ext uri="{FF2B5EF4-FFF2-40B4-BE49-F238E27FC236}">
-                <a16:creationId xmlns:a16="http://schemas.microsoft.com/office/drawing/2014/main" id="{788E4ADD-FD9A-B336-B626-9CBA2818A37E}"/>
+                <a16:creationId xmlns:a16="http://schemas.microsoft.com/office/drawing/2014/main" id="{DCC6912D-B26E-64CD-2071-2BAAF1E86474}"/>
               </a:ext>
             </a:extLst>
           </p:cNvPr>
@@ -3963,8 +3991,8 @@
         </p:blipFill>
         <p:spPr>
           <a:xfrm>
-            <a:off x="3688057" y="1434494"/>
-            <a:ext cx="4815885" cy="5133600"/>
+            <a:off x="3695875" y="1434494"/>
+            <a:ext cx="4800249" cy="5133600"/>
           </a:xfrm>
           <a:prstGeom prst="rect">
             <a:avLst/>
@@ -4119,10 +4147,10 @@
       </p:sp>
       <p:pic>
         <p:nvPicPr>
-          <p:cNvPr id="6" name="Grafik 5">
+          <p:cNvPr id="5" name="Grafik 4">
             <a:extLst>
               <a:ext uri="{FF2B5EF4-FFF2-40B4-BE49-F238E27FC236}">
-                <a16:creationId xmlns:a16="http://schemas.microsoft.com/office/drawing/2014/main" id="{8F2F3FAC-7E13-B1F9-911B-0F5A19EA0EA0}"/>
+                <a16:creationId xmlns:a16="http://schemas.microsoft.com/office/drawing/2014/main" id="{B30D1FAD-EC50-FDC5-FAB2-DE4B026AB1EC}"/>
               </a:ext>
             </a:extLst>
           </p:cNvPr>
@@ -4139,8 +4167,8 @@
         </p:blipFill>
         <p:spPr>
           <a:xfrm>
-            <a:off x="3688057" y="1434494"/>
-            <a:ext cx="4815885" cy="5133600"/>
+            <a:off x="3695875" y="1434494"/>
+            <a:ext cx="4800249" cy="5133600"/>
           </a:xfrm>
           <a:prstGeom prst="rect">
             <a:avLst/>
@@ -4295,10 +4323,10 @@
       </p:sp>
       <p:pic>
         <p:nvPicPr>
-          <p:cNvPr id="5" name="Grafik 4">
+          <p:cNvPr id="6" name="Grafik 5">
             <a:extLst>
               <a:ext uri="{FF2B5EF4-FFF2-40B4-BE49-F238E27FC236}">
-                <a16:creationId xmlns:a16="http://schemas.microsoft.com/office/drawing/2014/main" id="{26FF5C64-6AA2-19D4-E6BB-A3B1051E1BD6}"/>
+                <a16:creationId xmlns:a16="http://schemas.microsoft.com/office/drawing/2014/main" id="{B5A69F23-80F6-4D03-34BE-FAE77D9D1EB5}"/>
               </a:ext>
             </a:extLst>
           </p:cNvPr>
@@ -4315,8 +4343,8 @@
         </p:blipFill>
         <p:spPr>
           <a:xfrm>
-            <a:off x="3725681" y="1434494"/>
-            <a:ext cx="4740637" cy="5133600"/>
+            <a:off x="3733377" y="1434494"/>
+            <a:ext cx="4725245" cy="5133600"/>
           </a:xfrm>
           <a:prstGeom prst="rect">
             <a:avLst/>
@@ -4353,6 +4381,122 @@
           <a:chExt cx="0" cy="0"/>
         </a:xfrm>
       </p:grpSpPr>
+      <p:pic>
+        <p:nvPicPr>
+          <p:cNvPr id="16" name="Grafik 15">
+            <a:extLst>
+              <a:ext uri="{FF2B5EF4-FFF2-40B4-BE49-F238E27FC236}">
+                <a16:creationId xmlns:a16="http://schemas.microsoft.com/office/drawing/2014/main" id="{65912D00-04FA-D14F-0D0E-38B7141F4221}"/>
+              </a:ext>
+            </a:extLst>
+          </p:cNvPr>
+          <p:cNvPicPr>
+            <a:picLocks noChangeAspect="1"/>
+          </p:cNvPicPr>
+          <p:nvPr/>
+        </p:nvPicPr>
+        <p:blipFill rotWithShape="1">
+          <a:blip r:embed="rId2"/>
+          <a:srcRect r="61039"/>
+          <a:stretch/>
+        </p:blipFill>
+        <p:spPr>
+          <a:xfrm>
+            <a:off x="9317695" y="1359275"/>
+            <a:ext cx="1840988" cy="5133600"/>
+          </a:xfrm>
+          <a:prstGeom prst="rect">
+            <a:avLst/>
+          </a:prstGeom>
+        </p:spPr>
+      </p:pic>
+      <p:pic>
+        <p:nvPicPr>
+          <p:cNvPr id="14" name="Grafik 13">
+            <a:extLst>
+              <a:ext uri="{FF2B5EF4-FFF2-40B4-BE49-F238E27FC236}">
+                <a16:creationId xmlns:a16="http://schemas.microsoft.com/office/drawing/2014/main" id="{1F783AA4-674D-B824-2CCD-D83C75493A1A}"/>
+              </a:ext>
+            </a:extLst>
+          </p:cNvPr>
+          <p:cNvPicPr>
+            <a:picLocks noChangeAspect="1"/>
+          </p:cNvPicPr>
+          <p:nvPr/>
+        </p:nvPicPr>
+        <p:blipFill rotWithShape="1">
+          <a:blip r:embed="rId3"/>
+          <a:srcRect r="60552"/>
+          <a:stretch/>
+        </p:blipFill>
+        <p:spPr>
+          <a:xfrm>
+            <a:off x="6590267" y="1359275"/>
+            <a:ext cx="1893572" cy="5133600"/>
+          </a:xfrm>
+          <a:prstGeom prst="rect">
+            <a:avLst/>
+          </a:prstGeom>
+        </p:spPr>
+      </p:pic>
+      <p:pic>
+        <p:nvPicPr>
+          <p:cNvPr id="5" name="Grafik 4">
+            <a:extLst>
+              <a:ext uri="{FF2B5EF4-FFF2-40B4-BE49-F238E27FC236}">
+                <a16:creationId xmlns:a16="http://schemas.microsoft.com/office/drawing/2014/main" id="{5DD309CD-8615-283E-78CD-F399FB9E7D70}"/>
+              </a:ext>
+            </a:extLst>
+          </p:cNvPr>
+          <p:cNvPicPr>
+            <a:picLocks noChangeAspect="1"/>
+          </p:cNvPicPr>
+          <p:nvPr/>
+        </p:nvPicPr>
+        <p:blipFill rotWithShape="1">
+          <a:blip r:embed="rId4"/>
+          <a:srcRect r="60552"/>
+          <a:stretch/>
+        </p:blipFill>
+        <p:spPr>
+          <a:xfrm>
+            <a:off x="3628792" y="1359275"/>
+            <a:ext cx="1893572" cy="5133600"/>
+          </a:xfrm>
+          <a:prstGeom prst="rect">
+            <a:avLst/>
+          </a:prstGeom>
+        </p:spPr>
+      </p:pic>
+      <p:pic>
+        <p:nvPicPr>
+          <p:cNvPr id="4" name="Grafik 3">
+            <a:extLst>
+              <a:ext uri="{FF2B5EF4-FFF2-40B4-BE49-F238E27FC236}">
+                <a16:creationId xmlns:a16="http://schemas.microsoft.com/office/drawing/2014/main" id="{29C8DD3C-AB6F-51A8-A9AB-48469F8C3BAA}"/>
+              </a:ext>
+            </a:extLst>
+          </p:cNvPr>
+          <p:cNvPicPr>
+            <a:picLocks noChangeAspect="1"/>
+          </p:cNvPicPr>
+          <p:nvPr/>
+        </p:nvPicPr>
+        <p:blipFill rotWithShape="1">
+          <a:blip r:embed="rId5"/>
+          <a:srcRect r="59996"/>
+          <a:stretch/>
+        </p:blipFill>
+        <p:spPr>
+          <a:xfrm>
+            <a:off x="912835" y="1359275"/>
+            <a:ext cx="1920286" cy="5133600"/>
+          </a:xfrm>
+          <a:prstGeom prst="rect">
+            <a:avLst/>
+          </a:prstGeom>
+        </p:spPr>
+      </p:pic>
       <p:sp>
         <p:nvSpPr>
           <p:cNvPr id="2" name="Titel 1">
@@ -4425,35 +4569,6 @@
           </a:p>
         </p:txBody>
       </p:sp>
-      <p:pic>
-        <p:nvPicPr>
-          <p:cNvPr id="7" name="Grafik 6">
-            <a:extLst>
-              <a:ext uri="{FF2B5EF4-FFF2-40B4-BE49-F238E27FC236}">
-                <a16:creationId xmlns:a16="http://schemas.microsoft.com/office/drawing/2014/main" id="{8CCE814C-C989-2C81-2299-E7C97A6CCBC1}"/>
-              </a:ext>
-            </a:extLst>
-          </p:cNvPr>
-          <p:cNvPicPr>
-            <a:picLocks noChangeAspect="1"/>
-          </p:cNvPicPr>
-          <p:nvPr/>
-        </p:nvPicPr>
-        <p:blipFill rotWithShape="1">
-          <a:blip r:embed="rId2"/>
-          <a:srcRect r="61262"/>
-          <a:stretch/>
-        </p:blipFill>
-        <p:spPr>
-          <a:xfrm>
-            <a:off x="9400749" y="1359275"/>
-            <a:ext cx="1836442" cy="5133600"/>
-          </a:xfrm>
-          <a:prstGeom prst="rect">
-            <a:avLst/>
-          </a:prstGeom>
-        </p:spPr>
-      </p:pic>
       <p:sp>
         <p:nvSpPr>
           <p:cNvPr id="8" name="Textfeld 7">
@@ -4672,58 +4787,6 @@
       </p:sp>
       <p:sp>
         <p:nvSpPr>
-          <p:cNvPr id="12" name="Ellipse 11">
-            <a:extLst>
-              <a:ext uri="{FF2B5EF4-FFF2-40B4-BE49-F238E27FC236}">
-                <a16:creationId xmlns:a16="http://schemas.microsoft.com/office/drawing/2014/main" id="{46362ACE-0A07-51C2-8834-AAD09EF8B7CC}"/>
-              </a:ext>
-            </a:extLst>
-          </p:cNvPr>
-          <p:cNvSpPr/>
-          <p:nvPr/>
-        </p:nvSpPr>
-        <p:spPr>
-          <a:xfrm rot="953173">
-            <a:off x="1698158" y="4686649"/>
-            <a:ext cx="349640" cy="1649283"/>
-          </a:xfrm>
-          <a:prstGeom prst="ellipse">
-            <a:avLst/>
-          </a:prstGeom>
-          <a:noFill/>
-          <a:ln>
-            <a:solidFill>
-              <a:srgbClr val="FF0000"/>
-            </a:solidFill>
-          </a:ln>
-        </p:spPr>
-        <p:style>
-          <a:lnRef idx="2">
-            <a:schemeClr val="accent1">
-              <a:shade val="15000"/>
-            </a:schemeClr>
-          </a:lnRef>
-          <a:fillRef idx="1">
-            <a:schemeClr val="accent1"/>
-          </a:fillRef>
-          <a:effectRef idx="0">
-            <a:schemeClr val="accent1"/>
-          </a:effectRef>
-          <a:fontRef idx="minor">
-            <a:schemeClr val="lt1"/>
-          </a:fontRef>
-        </p:style>
-        <p:txBody>
-          <a:bodyPr rtlCol="0" anchor="ctr"/>
-          <a:lstStyle/>
-          <a:p>
-            <a:pPr algn="ctr"/>
-            <a:endParaRPr lang="en-US" dirty="0"/>
-          </a:p>
-        </p:txBody>
-      </p:sp>
-      <p:sp>
-        <p:nvSpPr>
           <p:cNvPr id="15" name="Ellipse 14">
             <a:extLst>
               <a:ext uri="{FF2B5EF4-FFF2-40B4-BE49-F238E27FC236}">
@@ -4736,7 +4799,7 @@
         </p:nvSpPr>
         <p:spPr>
           <a:xfrm rot="953173">
-            <a:off x="10810481" y="4677248"/>
+            <a:off x="10712923" y="4722874"/>
             <a:ext cx="317149" cy="1696770"/>
           </a:xfrm>
           <a:prstGeom prst="ellipse">
@@ -4788,7 +4851,7 @@
         </p:nvSpPr>
         <p:spPr>
           <a:xfrm rot="953173">
-            <a:off x="10121597" y="4775570"/>
+            <a:off x="10030263" y="4760332"/>
             <a:ext cx="233151" cy="491997"/>
           </a:xfrm>
           <a:prstGeom prst="ellipse">
@@ -4840,7 +4903,7 @@
         </p:nvSpPr>
         <p:spPr>
           <a:xfrm rot="953173">
-            <a:off x="10522052" y="4757062"/>
+            <a:off x="10409517" y="4752695"/>
             <a:ext cx="242007" cy="726787"/>
           </a:xfrm>
           <a:prstGeom prst="ellipse">
@@ -4878,35 +4941,6 @@
           </a:p>
         </p:txBody>
       </p:sp>
-      <p:pic>
-        <p:nvPicPr>
-          <p:cNvPr id="22" name="Grafik 21">
-            <a:extLst>
-              <a:ext uri="{FF2B5EF4-FFF2-40B4-BE49-F238E27FC236}">
-                <a16:creationId xmlns:a16="http://schemas.microsoft.com/office/drawing/2014/main" id="{79D2EF74-7A7B-270A-043C-EDCC21FB291C}"/>
-              </a:ext>
-            </a:extLst>
-          </p:cNvPr>
-          <p:cNvPicPr>
-            <a:picLocks noChangeAspect="1"/>
-          </p:cNvPicPr>
-          <p:nvPr/>
-        </p:nvPicPr>
-        <p:blipFill rotWithShape="1">
-          <a:blip r:embed="rId3"/>
-          <a:srcRect r="60126"/>
-          <a:stretch/>
-        </p:blipFill>
-        <p:spPr>
-          <a:xfrm>
-            <a:off x="933722" y="1359275"/>
-            <a:ext cx="1920286" cy="5133600"/>
-          </a:xfrm>
-          <a:prstGeom prst="rect">
-            <a:avLst/>
-          </a:prstGeom>
-        </p:spPr>
-      </p:pic>
       <p:sp>
         <p:nvSpPr>
           <p:cNvPr id="25" name="Ellipse 24">
@@ -5011,35 +5045,6 @@
           </a:p>
         </p:txBody>
       </p:sp>
-      <p:pic>
-        <p:nvPicPr>
-          <p:cNvPr id="27" name="Grafik 26">
-            <a:extLst>
-              <a:ext uri="{FF2B5EF4-FFF2-40B4-BE49-F238E27FC236}">
-                <a16:creationId xmlns:a16="http://schemas.microsoft.com/office/drawing/2014/main" id="{82E3C452-EF75-F8A0-E756-35B00666F744}"/>
-              </a:ext>
-            </a:extLst>
-          </p:cNvPr>
-          <p:cNvPicPr>
-            <a:picLocks noChangeAspect="1"/>
-          </p:cNvPicPr>
-          <p:nvPr/>
-        </p:nvPicPr>
-        <p:blipFill rotWithShape="1">
-          <a:blip r:embed="rId4"/>
-          <a:srcRect r="60340"/>
-          <a:stretch/>
-        </p:blipFill>
-        <p:spPr>
-          <a:xfrm>
-            <a:off x="3673019" y="1359275"/>
-            <a:ext cx="1910011" cy="5133600"/>
-          </a:xfrm>
-          <a:prstGeom prst="rect">
-            <a:avLst/>
-          </a:prstGeom>
-        </p:spPr>
-      </p:pic>
       <p:sp>
         <p:nvSpPr>
           <p:cNvPr id="28" name="Ellipse 27">
@@ -5054,7 +5059,7 @@
         </p:nvSpPr>
         <p:spPr>
           <a:xfrm rot="953173">
-            <a:off x="4402850" y="4701192"/>
+            <a:off x="4364043" y="4695891"/>
             <a:ext cx="349640" cy="1649283"/>
           </a:xfrm>
           <a:prstGeom prst="ellipse">
@@ -5106,7 +5111,7 @@
         </p:nvSpPr>
         <p:spPr>
           <a:xfrm rot="953173">
-            <a:off x="4887084" y="4707367"/>
+            <a:off x="4852292" y="4681797"/>
             <a:ext cx="201978" cy="633116"/>
           </a:xfrm>
           <a:prstGeom prst="ellipse">
@@ -5158,7 +5163,7 @@
         </p:nvSpPr>
         <p:spPr>
           <a:xfrm rot="953173">
-            <a:off x="5244174" y="4736850"/>
+            <a:off x="5185506" y="4737630"/>
             <a:ext cx="242007" cy="726787"/>
           </a:xfrm>
           <a:prstGeom prst="ellipse">
@@ -5196,35 +5201,6 @@
           </a:p>
         </p:txBody>
       </p:sp>
-      <p:pic>
-        <p:nvPicPr>
-          <p:cNvPr id="31" name="Grafik 30">
-            <a:extLst>
-              <a:ext uri="{FF2B5EF4-FFF2-40B4-BE49-F238E27FC236}">
-                <a16:creationId xmlns:a16="http://schemas.microsoft.com/office/drawing/2014/main" id="{B67B591E-9438-A161-CC45-E80DF385F39F}"/>
-              </a:ext>
-            </a:extLst>
-          </p:cNvPr>
-          <p:cNvPicPr>
-            <a:picLocks noChangeAspect="1"/>
-          </p:cNvPicPr>
-          <p:nvPr/>
-        </p:nvPicPr>
-        <p:blipFill rotWithShape="1">
-          <a:blip r:embed="rId5"/>
-          <a:srcRect r="60339"/>
-          <a:stretch/>
-        </p:blipFill>
-        <p:spPr>
-          <a:xfrm>
-            <a:off x="6612852" y="1359275"/>
-            <a:ext cx="1910012" cy="5133600"/>
-          </a:xfrm>
-          <a:prstGeom prst="rect">
-            <a:avLst/>
-          </a:prstGeom>
-        </p:spPr>
-      </p:pic>
       <p:sp>
         <p:nvSpPr>
           <p:cNvPr id="32" name="Ellipse 31">
@@ -5239,7 +5215,7 @@
         </p:nvSpPr>
         <p:spPr>
           <a:xfrm rot="953173">
-            <a:off x="7362758" y="4695890"/>
+            <a:off x="7325221" y="4678451"/>
             <a:ext cx="349640" cy="1649283"/>
           </a:xfrm>
           <a:prstGeom prst="ellipse">
@@ -5291,7 +5267,7 @@
         </p:nvSpPr>
         <p:spPr>
           <a:xfrm rot="953173">
-            <a:off x="7842719" y="4698879"/>
+            <a:off x="7799891" y="4733940"/>
             <a:ext cx="201978" cy="633116"/>
           </a:xfrm>
           <a:prstGeom prst="ellipse">
@@ -9427,10 +9403,10 @@
       </p:sp>
       <p:pic>
         <p:nvPicPr>
-          <p:cNvPr id="5" name="Grafik 4">
+          <p:cNvPr id="6" name="Grafik 5">
             <a:extLst>
               <a:ext uri="{FF2B5EF4-FFF2-40B4-BE49-F238E27FC236}">
-                <a16:creationId xmlns:a16="http://schemas.microsoft.com/office/drawing/2014/main" id="{8B9619EB-5444-622F-68FA-1CE962D440AD}"/>
+                <a16:creationId xmlns:a16="http://schemas.microsoft.com/office/drawing/2014/main" id="{E8D714C7-5F62-0E46-C7CF-83A406556734}"/>
               </a:ext>
             </a:extLst>
           </p:cNvPr>
@@ -16446,10 +16422,10 @@
       </p:sp>
       <p:pic>
         <p:nvPicPr>
-          <p:cNvPr id="5" name="Grafik 4">
+          <p:cNvPr id="6" name="Grafik 5">
             <a:extLst>
               <a:ext uri="{FF2B5EF4-FFF2-40B4-BE49-F238E27FC236}">
-                <a16:creationId xmlns:a16="http://schemas.microsoft.com/office/drawing/2014/main" id="{FCB59681-1583-206C-3823-FB20B3D47E20}"/>
+                <a16:creationId xmlns:a16="http://schemas.microsoft.com/office/drawing/2014/main" id="{71E7CC4E-D852-5AFC-3D80-5581798583F7}"/>
               </a:ext>
             </a:extLst>
           </p:cNvPr>
@@ -16466,8 +16442,8 @@
         </p:blipFill>
         <p:spPr>
           <a:xfrm>
-            <a:off x="3148157" y="1847789"/>
-            <a:ext cx="5895686" cy="4645086"/>
+            <a:off x="3147600" y="1669377"/>
+            <a:ext cx="5896800" cy="4663833"/>
           </a:xfrm>
           <a:prstGeom prst="rect">
             <a:avLst/>
@@ -16509,7 +16485,7 @@
           <p:cNvPr id="2" name="Titel 1">
             <a:extLst>
               <a:ext uri="{FF2B5EF4-FFF2-40B4-BE49-F238E27FC236}">
-                <a16:creationId xmlns:a16="http://schemas.microsoft.com/office/drawing/2014/main" id="{74739D04-C314-DD4D-9BA5-6BA75D2C249A}"/>
+                <a16:creationId xmlns:a16="http://schemas.microsoft.com/office/drawing/2014/main" id="{7E453F76-D25F-44A6-187F-EC95CE5C9795}"/>
               </a:ext>
             </a:extLst>
           </p:cNvPr>
@@ -16517,7 +16493,7 @@
             <a:spLocks noGrp="1"/>
           </p:cNvSpPr>
           <p:nvPr>
-            <p:ph type="ctrTitle"/>
+            <p:ph type="title"/>
           </p:nvPr>
         </p:nvSpPr>
         <p:spPr/>
@@ -16525,16 +16501,170 @@
           <a:bodyPr/>
           <a:lstStyle/>
           <a:p>
-            <a:endParaRPr lang="en-US"/>
+            <a:r>
+              <a:rPr lang="en-DE" b="1" dirty="0" err="1">
+                <a:ln w="10160">
+                  <a:solidFill>
+                    <a:schemeClr val="tx1"/>
+                  </a:solidFill>
+                  <a:prstDash val="solid"/>
+                </a:ln>
+                <a:solidFill>
+                  <a:srgbClr val="FFFFFF"/>
+                </a:solidFill>
+                <a:effectLst>
+                  <a:outerShdw blurRad="38100" dist="22860" dir="5400000" algn="tl" rotWithShape="0">
+                    <a:srgbClr val="000000">
+                      <a:alpha val="30000"/>
+                    </a:srgbClr>
+                  </a:outerShdw>
+                </a:effectLst>
+                <a:latin typeface="Roboto" panose="020F0502020204030204" pitchFamily="2" charset="0"/>
+              </a:rPr>
+              <a:t>Visualisierung</a:t>
+            </a:r>
+            <a:r>
+              <a:rPr lang="en-DE" b="1" dirty="0">
+                <a:ln w="10160">
+                  <a:solidFill>
+                    <a:schemeClr val="tx1"/>
+                  </a:solidFill>
+                  <a:prstDash val="solid"/>
+                </a:ln>
+                <a:solidFill>
+                  <a:srgbClr val="FFFFFF"/>
+                </a:solidFill>
+                <a:effectLst>
+                  <a:outerShdw blurRad="38100" dist="22860" dir="5400000" algn="tl" rotWithShape="0">
+                    <a:srgbClr val="000000">
+                      <a:alpha val="30000"/>
+                    </a:srgbClr>
+                  </a:outerShdw>
+                </a:effectLst>
+                <a:latin typeface="Roboto" panose="020F0502020204030204" pitchFamily="2" charset="0"/>
+              </a:rPr>
+              <a:t> der </a:t>
+            </a:r>
+            <a:r>
+              <a:rPr lang="en-DE" b="1" dirty="0" err="1">
+                <a:ln w="10160">
+                  <a:solidFill>
+                    <a:schemeClr val="tx1"/>
+                  </a:solidFill>
+                  <a:prstDash val="solid"/>
+                </a:ln>
+                <a:solidFill>
+                  <a:srgbClr val="FFFFFF"/>
+                </a:solidFill>
+                <a:effectLst>
+                  <a:outerShdw blurRad="38100" dist="22860" dir="5400000" algn="tl" rotWithShape="0">
+                    <a:srgbClr val="000000">
+                      <a:alpha val="30000"/>
+                    </a:srgbClr>
+                  </a:outerShdw>
+                </a:effectLst>
+                <a:latin typeface="Roboto" panose="020F0502020204030204" pitchFamily="2" charset="0"/>
+              </a:rPr>
+              <a:t>Beziehungen</a:t>
+            </a:r>
+            <a:r>
+              <a:rPr lang="en-DE" b="1" dirty="0">
+                <a:ln w="10160">
+                  <a:solidFill>
+                    <a:schemeClr val="tx1"/>
+                  </a:solidFill>
+                  <a:prstDash val="solid"/>
+                </a:ln>
+                <a:solidFill>
+                  <a:srgbClr val="FFFFFF"/>
+                </a:solidFill>
+                <a:effectLst>
+                  <a:outerShdw blurRad="38100" dist="22860" dir="5400000" algn="tl" rotWithShape="0">
+                    <a:srgbClr val="000000">
+                      <a:alpha val="30000"/>
+                    </a:srgbClr>
+                  </a:outerShdw>
+                </a:effectLst>
+                <a:latin typeface="Roboto" panose="020F0502020204030204" pitchFamily="2" charset="0"/>
+              </a:rPr>
+              <a:t> </a:t>
+            </a:r>
+            <a:r>
+              <a:rPr lang="en-DE" b="1" dirty="0" err="1">
+                <a:ln w="10160">
+                  <a:solidFill>
+                    <a:schemeClr val="tx1"/>
+                  </a:solidFill>
+                  <a:prstDash val="solid"/>
+                </a:ln>
+                <a:solidFill>
+                  <a:srgbClr val="FFFFFF"/>
+                </a:solidFill>
+                <a:effectLst>
+                  <a:outerShdw blurRad="38100" dist="22860" dir="5400000" algn="tl" rotWithShape="0">
+                    <a:srgbClr val="000000">
+                      <a:alpha val="30000"/>
+                    </a:srgbClr>
+                  </a:outerShdw>
+                </a:effectLst>
+                <a:latin typeface="Roboto" panose="020F0502020204030204" pitchFamily="2" charset="0"/>
+              </a:rPr>
+              <a:t>mit</a:t>
+            </a:r>
+            <a:r>
+              <a:rPr lang="en-DE" b="1" dirty="0">
+                <a:ln w="10160">
+                  <a:solidFill>
+                    <a:schemeClr val="tx1"/>
+                  </a:solidFill>
+                  <a:prstDash val="solid"/>
+                </a:ln>
+                <a:solidFill>
+                  <a:srgbClr val="FFFFFF"/>
+                </a:solidFill>
+                <a:effectLst>
+                  <a:outerShdw blurRad="38100" dist="22860" dir="5400000" algn="tl" rotWithShape="0">
+                    <a:srgbClr val="000000">
+                      <a:alpha val="30000"/>
+                    </a:srgbClr>
+                  </a:outerShdw>
+                </a:effectLst>
+                <a:latin typeface="Roboto" panose="020F0502020204030204" pitchFamily="2" charset="0"/>
+              </a:rPr>
+              <a:t> </a:t>
+            </a:r>
+            <a:r>
+              <a:rPr lang="en-DE" b="1" dirty="0" err="1">
+                <a:ln w="10160">
+                  <a:solidFill>
+                    <a:schemeClr val="tx1"/>
+                  </a:solidFill>
+                  <a:prstDash val="solid"/>
+                </a:ln>
+                <a:solidFill>
+                  <a:srgbClr val="FFFFFF"/>
+                </a:solidFill>
+                <a:effectLst>
+                  <a:outerShdw blurRad="38100" dist="22860" dir="5400000" algn="tl" rotWithShape="0">
+                    <a:srgbClr val="000000">
+                      <a:alpha val="30000"/>
+                    </a:srgbClr>
+                  </a:outerShdw>
+                </a:effectLst>
+                <a:latin typeface="Roboto" panose="020F0502020204030204" pitchFamily="2" charset="0"/>
+              </a:rPr>
+              <a:t>NetworkX</a:t>
+            </a:r>
+            <a:endParaRPr lang="en-US" dirty="0"/>
           </a:p>
         </p:txBody>
       </p:sp>
       <p:sp>
         <p:nvSpPr>
-          <p:cNvPr id="3" name="Untertitel 2">
+          <p:cNvPr id="3" name="Inhaltsplatzhalter 2">
             <a:extLst>
               <a:ext uri="{FF2B5EF4-FFF2-40B4-BE49-F238E27FC236}">
-                <a16:creationId xmlns:a16="http://schemas.microsoft.com/office/drawing/2014/main" id="{4E1EA583-A44B-6915-8A67-90EC70958F07}"/>
+                <a16:creationId xmlns:a16="http://schemas.microsoft.com/office/drawing/2014/main" id="{20B6C5B2-4636-7856-F985-B9A6A40B06E2}"/>
               </a:ext>
             </a:extLst>
           </p:cNvPr>
@@ -16542,7 +16672,7 @@
             <a:spLocks noGrp="1"/>
           </p:cNvSpPr>
           <p:nvPr>
-            <p:ph type="subTitle" idx="1"/>
+            <p:ph idx="1"/>
           </p:nvPr>
         </p:nvSpPr>
         <p:spPr/>
@@ -16550,61 +16680,44 @@
           <a:bodyPr/>
           <a:lstStyle/>
           <a:p>
-            <a:endParaRPr lang="en-US"/>
+            <a:endParaRPr lang="en-US" dirty="0"/>
           </a:p>
         </p:txBody>
       </p:sp>
       <p:pic>
         <p:nvPicPr>
-          <p:cNvPr id="3074" name="Picture 2" descr="Spider-Man vs Wolverine Finally Gets a Definitive Answer">
+          <p:cNvPr id="8" name="Grafik 7">
             <a:extLst>
               <a:ext uri="{FF2B5EF4-FFF2-40B4-BE49-F238E27FC236}">
-                <a16:creationId xmlns:a16="http://schemas.microsoft.com/office/drawing/2014/main" id="{8426E9E2-FA32-9C53-D3E3-6FA7D87DFD80}"/>
+                <a16:creationId xmlns:a16="http://schemas.microsoft.com/office/drawing/2014/main" id="{EACA22C4-9561-3832-E001-613E002ABCF1}"/>
               </a:ext>
             </a:extLst>
           </p:cNvPr>
           <p:cNvPicPr>
-            <a:picLocks noChangeAspect="1" noChangeArrowheads="1"/>
+            <a:picLocks noChangeAspect="1"/>
           </p:cNvPicPr>
           <p:nvPr/>
         </p:nvPicPr>
         <p:blipFill>
-          <a:blip r:embed="rId2">
-            <a:extLst>
-              <a:ext uri="{28A0092B-C50C-407E-A947-70E740481C1C}">
-                <a14:useLocalDpi xmlns:a14="http://schemas.microsoft.com/office/drawing/2010/main" val="0"/>
-              </a:ext>
-            </a:extLst>
-          </a:blip>
-          <a:srcRect/>
+          <a:blip r:embed="rId2"/>
           <a:stretch>
             <a:fillRect/>
           </a:stretch>
         </p:blipFill>
-        <p:spPr bwMode="auto">
+        <p:spPr>
           <a:xfrm>
-            <a:off x="2205037" y="1483518"/>
-            <a:ext cx="7781926" cy="3890963"/>
+            <a:off x="3147600" y="1669377"/>
+            <a:ext cx="5896800" cy="4663833"/>
           </a:xfrm>
           <a:prstGeom prst="rect">
             <a:avLst/>
           </a:prstGeom>
-          <a:noFill/>
-          <a:extLst>
-            <a:ext uri="{909E8E84-426E-40DD-AFC4-6F175D3DCCD1}">
-              <a14:hiddenFill xmlns:a14="http://schemas.microsoft.com/office/drawing/2010/main">
-                <a:solidFill>
-                  <a:srgbClr val="FFFFFF"/>
-                </a:solidFill>
-              </a14:hiddenFill>
-            </a:ext>
-          </a:extLst>
         </p:spPr>
       </p:pic>
     </p:spTree>
     <p:extLst>
       <p:ext uri="{BB962C8B-B14F-4D97-AF65-F5344CB8AC3E}">
-        <p14:creationId xmlns:p14="http://schemas.microsoft.com/office/powerpoint/2010/main" val="3125972572"/>
+        <p14:creationId xmlns:p14="http://schemas.microsoft.com/office/powerpoint/2010/main" val="3643909896"/>
       </p:ext>
     </p:extLst>
   </p:cSld>
@@ -16636,7 +16749,7 @@
           <p:cNvPr id="2" name="Titel 1">
             <a:extLst>
               <a:ext uri="{FF2B5EF4-FFF2-40B4-BE49-F238E27FC236}">
-                <a16:creationId xmlns:a16="http://schemas.microsoft.com/office/drawing/2014/main" id="{05EBC575-35D8-BAA2-4ACE-52C845C31B7C}"/>
+                <a16:creationId xmlns:a16="http://schemas.microsoft.com/office/drawing/2014/main" id="{7E453F76-D25F-44A6-187F-EC95CE5C9795}"/>
               </a:ext>
             </a:extLst>
           </p:cNvPr>
@@ -16672,7 +16785,139 @@
                 </a:effectLst>
                 <a:latin typeface="Roboto" panose="020F0502020204030204" pitchFamily="2" charset="0"/>
               </a:rPr>
-              <a:t>Conclusio</a:t>
+              <a:t>Visualisierung</a:t>
+            </a:r>
+            <a:r>
+              <a:rPr lang="en-DE" b="1" dirty="0">
+                <a:ln w="10160">
+                  <a:solidFill>
+                    <a:schemeClr val="tx1"/>
+                  </a:solidFill>
+                  <a:prstDash val="solid"/>
+                </a:ln>
+                <a:solidFill>
+                  <a:srgbClr val="FFFFFF"/>
+                </a:solidFill>
+                <a:effectLst>
+                  <a:outerShdw blurRad="38100" dist="22860" dir="5400000" algn="tl" rotWithShape="0">
+                    <a:srgbClr val="000000">
+                      <a:alpha val="30000"/>
+                    </a:srgbClr>
+                  </a:outerShdw>
+                </a:effectLst>
+                <a:latin typeface="Roboto" panose="020F0502020204030204" pitchFamily="2" charset="0"/>
+              </a:rPr>
+              <a:t> der </a:t>
+            </a:r>
+            <a:r>
+              <a:rPr lang="en-DE" b="1" dirty="0" err="1">
+                <a:ln w="10160">
+                  <a:solidFill>
+                    <a:schemeClr val="tx1"/>
+                  </a:solidFill>
+                  <a:prstDash val="solid"/>
+                </a:ln>
+                <a:solidFill>
+                  <a:srgbClr val="FFFFFF"/>
+                </a:solidFill>
+                <a:effectLst>
+                  <a:outerShdw blurRad="38100" dist="22860" dir="5400000" algn="tl" rotWithShape="0">
+                    <a:srgbClr val="000000">
+                      <a:alpha val="30000"/>
+                    </a:srgbClr>
+                  </a:outerShdw>
+                </a:effectLst>
+                <a:latin typeface="Roboto" panose="020F0502020204030204" pitchFamily="2" charset="0"/>
+              </a:rPr>
+              <a:t>Beziehungen</a:t>
+            </a:r>
+            <a:r>
+              <a:rPr lang="en-DE" b="1" dirty="0">
+                <a:ln w="10160">
+                  <a:solidFill>
+                    <a:schemeClr val="tx1"/>
+                  </a:solidFill>
+                  <a:prstDash val="solid"/>
+                </a:ln>
+                <a:solidFill>
+                  <a:srgbClr val="FFFFFF"/>
+                </a:solidFill>
+                <a:effectLst>
+                  <a:outerShdw blurRad="38100" dist="22860" dir="5400000" algn="tl" rotWithShape="0">
+                    <a:srgbClr val="000000">
+                      <a:alpha val="30000"/>
+                    </a:srgbClr>
+                  </a:outerShdw>
+                </a:effectLst>
+                <a:latin typeface="Roboto" panose="020F0502020204030204" pitchFamily="2" charset="0"/>
+              </a:rPr>
+              <a:t> </a:t>
+            </a:r>
+            <a:r>
+              <a:rPr lang="en-DE" b="1" dirty="0" err="1">
+                <a:ln w="10160">
+                  <a:solidFill>
+                    <a:schemeClr val="tx1"/>
+                  </a:solidFill>
+                  <a:prstDash val="solid"/>
+                </a:ln>
+                <a:solidFill>
+                  <a:srgbClr val="FFFFFF"/>
+                </a:solidFill>
+                <a:effectLst>
+                  <a:outerShdw blurRad="38100" dist="22860" dir="5400000" algn="tl" rotWithShape="0">
+                    <a:srgbClr val="000000">
+                      <a:alpha val="30000"/>
+                    </a:srgbClr>
+                  </a:outerShdw>
+                </a:effectLst>
+                <a:latin typeface="Roboto" panose="020F0502020204030204" pitchFamily="2" charset="0"/>
+              </a:rPr>
+              <a:t>mit</a:t>
+            </a:r>
+            <a:r>
+              <a:rPr lang="en-DE" b="1" dirty="0">
+                <a:ln w="10160">
+                  <a:solidFill>
+                    <a:schemeClr val="tx1"/>
+                  </a:solidFill>
+                  <a:prstDash val="solid"/>
+                </a:ln>
+                <a:solidFill>
+                  <a:srgbClr val="FFFFFF"/>
+                </a:solidFill>
+                <a:effectLst>
+                  <a:outerShdw blurRad="38100" dist="22860" dir="5400000" algn="tl" rotWithShape="0">
+                    <a:srgbClr val="000000">
+                      <a:alpha val="30000"/>
+                    </a:srgbClr>
+                  </a:outerShdw>
+                </a:effectLst>
+                <a:latin typeface="Roboto" panose="020F0502020204030204" pitchFamily="2" charset="0"/>
+              </a:rPr>
+              <a:t> </a:t>
+            </a:r>
+            <a:r>
+              <a:rPr lang="en-DE" b="1" dirty="0" err="1">
+                <a:ln w="10160">
+                  <a:solidFill>
+                    <a:schemeClr val="tx1"/>
+                  </a:solidFill>
+                  <a:prstDash val="solid"/>
+                </a:ln>
+                <a:solidFill>
+                  <a:srgbClr val="FFFFFF"/>
+                </a:solidFill>
+                <a:effectLst>
+                  <a:outerShdw blurRad="38100" dist="22860" dir="5400000" algn="tl" rotWithShape="0">
+                    <a:srgbClr val="000000">
+                      <a:alpha val="30000"/>
+                    </a:srgbClr>
+                  </a:outerShdw>
+                </a:effectLst>
+                <a:latin typeface="Roboto" panose="020F0502020204030204" pitchFamily="2" charset="0"/>
+              </a:rPr>
+              <a:t>NetworkX</a:t>
             </a:r>
             <a:endParaRPr lang="en-US" dirty="0"/>
           </a:p>
@@ -16683,7 +16928,7 @@
           <p:cNvPr id="3" name="Inhaltsplatzhalter 2">
             <a:extLst>
               <a:ext uri="{FF2B5EF4-FFF2-40B4-BE49-F238E27FC236}">
-                <a16:creationId xmlns:a16="http://schemas.microsoft.com/office/drawing/2014/main" id="{9DD7EA35-CDDE-C5F7-A931-6F63FE3E18E2}"/>
+                <a16:creationId xmlns:a16="http://schemas.microsoft.com/office/drawing/2014/main" id="{20B6C5B2-4636-7856-F985-B9A6A40B06E2}"/>
               </a:ext>
             </a:extLst>
           </p:cNvPr>
@@ -16699,408 +16944,44 @@
           <a:bodyPr/>
           <a:lstStyle/>
           <a:p>
-            <a:r>
-              <a:rPr lang="en-DE" b="1" dirty="0">
-                <a:ln w="10160">
-                  <a:solidFill>
-                    <a:schemeClr val="tx1"/>
-                  </a:solidFill>
-                  <a:prstDash val="solid"/>
-                </a:ln>
-                <a:solidFill>
-                  <a:srgbClr val="FFFFFF"/>
-                </a:solidFill>
-                <a:effectLst>
-                  <a:outerShdw blurRad="38100" dist="22860" dir="5400000" algn="tl" rotWithShape="0">
-                    <a:srgbClr val="000000">
-                      <a:alpha val="30000"/>
-                    </a:srgbClr>
-                  </a:outerShdw>
-                </a:effectLst>
-                <a:latin typeface="Roboto" panose="020F0502020204030204" pitchFamily="2" charset="0"/>
-              </a:rPr>
-              <a:t>Spider-Man und X-Men </a:t>
-            </a:r>
-            <a:r>
-              <a:rPr lang="en-DE" b="1" dirty="0" err="1">
-                <a:ln w="10160">
-                  <a:solidFill>
-                    <a:schemeClr val="tx1"/>
-                  </a:solidFill>
-                  <a:prstDash val="solid"/>
-                </a:ln>
-                <a:solidFill>
-                  <a:srgbClr val="FFFFFF"/>
-                </a:solidFill>
-                <a:effectLst>
-                  <a:outerShdw blurRad="38100" dist="22860" dir="5400000" algn="tl" rotWithShape="0">
-                    <a:srgbClr val="000000">
-                      <a:alpha val="30000"/>
-                    </a:srgbClr>
-                  </a:outerShdw>
-                </a:effectLst>
-                <a:latin typeface="Roboto" panose="020F0502020204030204" pitchFamily="2" charset="0"/>
-              </a:rPr>
-              <a:t>bleiben</a:t>
-            </a:r>
-            <a:r>
-              <a:rPr lang="en-DE" b="1" dirty="0">
-                <a:ln w="10160">
-                  <a:solidFill>
-                    <a:schemeClr val="tx1"/>
-                  </a:solidFill>
-                  <a:prstDash val="solid"/>
-                </a:ln>
-                <a:solidFill>
-                  <a:srgbClr val="FFFFFF"/>
-                </a:solidFill>
-                <a:effectLst>
-                  <a:outerShdw blurRad="38100" dist="22860" dir="5400000" algn="tl" rotWithShape="0">
-                    <a:srgbClr val="000000">
-                      <a:alpha val="30000"/>
-                    </a:srgbClr>
-                  </a:outerShdw>
-                </a:effectLst>
-                <a:latin typeface="Roboto" panose="020F0502020204030204" pitchFamily="2" charset="0"/>
-              </a:rPr>
-              <a:t> die </a:t>
-            </a:r>
-            <a:r>
-              <a:rPr lang="en-DE" b="1" dirty="0" err="1">
-                <a:ln w="10160">
-                  <a:solidFill>
-                    <a:schemeClr val="tx1"/>
-                  </a:solidFill>
-                  <a:prstDash val="solid"/>
-                </a:ln>
-                <a:solidFill>
-                  <a:srgbClr val="FFFFFF"/>
-                </a:solidFill>
-                <a:effectLst>
-                  <a:outerShdw blurRad="38100" dist="22860" dir="5400000" algn="tl" rotWithShape="0">
-                    <a:srgbClr val="000000">
-                      <a:alpha val="30000"/>
-                    </a:srgbClr>
-                  </a:outerShdw>
-                </a:effectLst>
-                <a:latin typeface="Roboto" panose="020F0502020204030204" pitchFamily="2" charset="0"/>
-              </a:rPr>
-              <a:t>populärsten</a:t>
-            </a:r>
-            <a:r>
-              <a:rPr lang="en-DE" b="1" dirty="0">
-                <a:ln w="10160">
-                  <a:solidFill>
-                    <a:schemeClr val="tx1"/>
-                  </a:solidFill>
-                  <a:prstDash val="solid"/>
-                </a:ln>
-                <a:solidFill>
-                  <a:srgbClr val="FFFFFF"/>
-                </a:solidFill>
-                <a:effectLst>
-                  <a:outerShdw blurRad="38100" dist="22860" dir="5400000" algn="tl" rotWithShape="0">
-                    <a:srgbClr val="000000">
-                      <a:alpha val="30000"/>
-                    </a:srgbClr>
-                  </a:outerShdw>
-                </a:effectLst>
-                <a:latin typeface="Roboto" panose="020F0502020204030204" pitchFamily="2" charset="0"/>
-              </a:rPr>
-              <a:t> </a:t>
-            </a:r>
-            <a:r>
-              <a:rPr lang="en-DE" b="1" dirty="0" err="1">
-                <a:ln w="10160">
-                  <a:solidFill>
-                    <a:schemeClr val="tx1"/>
-                  </a:solidFill>
-                  <a:prstDash val="solid"/>
-                </a:ln>
-                <a:solidFill>
-                  <a:srgbClr val="FFFFFF"/>
-                </a:solidFill>
-                <a:effectLst>
-                  <a:outerShdw blurRad="38100" dist="22860" dir="5400000" algn="tl" rotWithShape="0">
-                    <a:srgbClr val="000000">
-                      <a:alpha val="30000"/>
-                    </a:srgbClr>
-                  </a:outerShdw>
-                </a:effectLst>
-                <a:latin typeface="Roboto" panose="020F0502020204030204" pitchFamily="2" charset="0"/>
-              </a:rPr>
-              <a:t>Charaktere</a:t>
-            </a:r>
-            <a:endParaRPr lang="en-DE" b="1" dirty="0">
-              <a:ln w="10160">
-                <a:solidFill>
-                  <a:schemeClr val="tx1"/>
-                </a:solidFill>
-                <a:prstDash val="solid"/>
-              </a:ln>
-              <a:solidFill>
-                <a:srgbClr val="FFFFFF"/>
-              </a:solidFill>
-              <a:effectLst>
-                <a:outerShdw blurRad="38100" dist="22860" dir="5400000" algn="tl" rotWithShape="0">
-                  <a:srgbClr val="000000">
-                    <a:alpha val="30000"/>
-                  </a:srgbClr>
-                </a:outerShdw>
-              </a:effectLst>
-              <a:latin typeface="Roboto" panose="020F0502020204030204" pitchFamily="2" charset="0"/>
-            </a:endParaRPr>
-          </a:p>
-          <a:p>
-            <a:r>
-              <a:rPr lang="en-DE" b="1" dirty="0">
-                <a:ln w="10160">
-                  <a:solidFill>
-                    <a:schemeClr val="tx1"/>
-                  </a:solidFill>
-                  <a:prstDash val="solid"/>
-                </a:ln>
-                <a:solidFill>
-                  <a:srgbClr val="FFFFFF"/>
-                </a:solidFill>
-                <a:effectLst>
-                  <a:outerShdw blurRad="38100" dist="22860" dir="5400000" algn="tl" rotWithShape="0">
-                    <a:srgbClr val="000000">
-                      <a:alpha val="30000"/>
-                    </a:srgbClr>
-                  </a:outerShdw>
-                </a:effectLst>
-                <a:latin typeface="Roboto" panose="020F0502020204030204" pitchFamily="2" charset="0"/>
-              </a:rPr>
-              <a:t>X-Men </a:t>
-            </a:r>
-            <a:r>
-              <a:rPr lang="en-DE" b="1" dirty="0" err="1">
-                <a:ln w="10160">
-                  <a:solidFill>
-                    <a:schemeClr val="tx1"/>
-                  </a:solidFill>
-                  <a:prstDash val="solid"/>
-                </a:ln>
-                <a:solidFill>
-                  <a:srgbClr val="FFFFFF"/>
-                </a:solidFill>
-                <a:effectLst>
-                  <a:outerShdw blurRad="38100" dist="22860" dir="5400000" algn="tl" rotWithShape="0">
-                    <a:srgbClr val="000000">
-                      <a:alpha val="30000"/>
-                    </a:srgbClr>
-                  </a:outerShdw>
-                </a:effectLst>
-                <a:latin typeface="Roboto" panose="020F0502020204030204" pitchFamily="2" charset="0"/>
-              </a:rPr>
-              <a:t>dominieren</a:t>
-            </a:r>
-            <a:r>
-              <a:rPr lang="en-DE" b="1" dirty="0">
-                <a:ln w="10160">
-                  <a:solidFill>
-                    <a:schemeClr val="tx1"/>
-                  </a:solidFill>
-                  <a:prstDash val="solid"/>
-                </a:ln>
-                <a:solidFill>
-                  <a:srgbClr val="FFFFFF"/>
-                </a:solidFill>
-                <a:effectLst>
-                  <a:outerShdw blurRad="38100" dist="22860" dir="5400000" algn="tl" rotWithShape="0">
-                    <a:srgbClr val="000000">
-                      <a:alpha val="30000"/>
-                    </a:srgbClr>
-                  </a:outerShdw>
-                </a:effectLst>
-                <a:latin typeface="Roboto" panose="020F0502020204030204" pitchFamily="2" charset="0"/>
-              </a:rPr>
-              <a:t> in den </a:t>
-            </a:r>
-            <a:r>
-              <a:rPr lang="en-DE" b="1" dirty="0" err="1">
-                <a:ln w="10160">
-                  <a:solidFill>
-                    <a:schemeClr val="tx1"/>
-                  </a:solidFill>
-                  <a:prstDash val="solid"/>
-                </a:ln>
-                <a:solidFill>
-                  <a:srgbClr val="FFFFFF"/>
-                </a:solidFill>
-                <a:effectLst>
-                  <a:outerShdw blurRad="38100" dist="22860" dir="5400000" algn="tl" rotWithShape="0">
-                    <a:srgbClr val="000000">
-                      <a:alpha val="30000"/>
-                    </a:srgbClr>
-                  </a:outerShdw>
-                </a:effectLst>
-                <a:latin typeface="Roboto" panose="020F0502020204030204" pitchFamily="2" charset="0"/>
-              </a:rPr>
-              <a:t>Beziehungen</a:t>
-            </a:r>
-            <a:r>
-              <a:rPr lang="en-DE" b="1" dirty="0">
-                <a:ln w="10160">
-                  <a:solidFill>
-                    <a:schemeClr val="tx1"/>
-                  </a:solidFill>
-                  <a:prstDash val="solid"/>
-                </a:ln>
-                <a:solidFill>
-                  <a:srgbClr val="FFFFFF"/>
-                </a:solidFill>
-                <a:effectLst>
-                  <a:outerShdw blurRad="38100" dist="22860" dir="5400000" algn="tl" rotWithShape="0">
-                    <a:srgbClr val="000000">
-                      <a:alpha val="30000"/>
-                    </a:srgbClr>
-                  </a:outerShdw>
-                </a:effectLst>
-                <a:latin typeface="Roboto" panose="020F0502020204030204" pitchFamily="2" charset="0"/>
-              </a:rPr>
-              <a:t> </a:t>
-            </a:r>
-            <a:r>
-              <a:rPr lang="en-DE" b="1" dirty="0" err="1">
-                <a:ln w="10160">
-                  <a:solidFill>
-                    <a:schemeClr val="tx1"/>
-                  </a:solidFill>
-                  <a:prstDash val="solid"/>
-                </a:ln>
-                <a:solidFill>
-                  <a:srgbClr val="FFFFFF"/>
-                </a:solidFill>
-                <a:effectLst>
-                  <a:outerShdw blurRad="38100" dist="22860" dir="5400000" algn="tl" rotWithShape="0">
-                    <a:srgbClr val="000000">
-                      <a:alpha val="30000"/>
-                    </a:srgbClr>
-                  </a:outerShdw>
-                </a:effectLst>
-                <a:latin typeface="Roboto" panose="020F0502020204030204" pitchFamily="2" charset="0"/>
-              </a:rPr>
-              <a:t>mit</a:t>
-            </a:r>
-            <a:r>
-              <a:rPr lang="en-DE" b="1" dirty="0">
-                <a:ln w="10160">
-                  <a:solidFill>
-                    <a:schemeClr val="tx1"/>
-                  </a:solidFill>
-                  <a:prstDash val="solid"/>
-                </a:ln>
-                <a:solidFill>
-                  <a:srgbClr val="FFFFFF"/>
-                </a:solidFill>
-                <a:effectLst>
-                  <a:outerShdw blurRad="38100" dist="22860" dir="5400000" algn="tl" rotWithShape="0">
-                    <a:srgbClr val="000000">
-                      <a:alpha val="30000"/>
-                    </a:srgbClr>
-                  </a:outerShdw>
-                </a:effectLst>
-                <a:latin typeface="Roboto" panose="020F0502020204030204" pitchFamily="2" charset="0"/>
-              </a:rPr>
-              <a:t> </a:t>
-            </a:r>
-            <a:r>
-              <a:rPr lang="en-DE" b="1" dirty="0" err="1">
-                <a:ln w="10160">
-                  <a:solidFill>
-                    <a:schemeClr val="tx1"/>
-                  </a:solidFill>
-                  <a:prstDash val="solid"/>
-                </a:ln>
-                <a:solidFill>
-                  <a:srgbClr val="FFFFFF"/>
-                </a:solidFill>
-                <a:effectLst>
-                  <a:outerShdw blurRad="38100" dist="22860" dir="5400000" algn="tl" rotWithShape="0">
-                    <a:srgbClr val="000000">
-                      <a:alpha val="30000"/>
-                    </a:srgbClr>
-                  </a:outerShdw>
-                </a:effectLst>
-                <a:latin typeface="Roboto" panose="020F0502020204030204" pitchFamily="2" charset="0"/>
-              </a:rPr>
-              <a:t>anderen</a:t>
-            </a:r>
-            <a:r>
-              <a:rPr lang="en-DE" b="1" dirty="0">
-                <a:ln w="10160">
-                  <a:solidFill>
-                    <a:schemeClr val="tx1"/>
-                  </a:solidFill>
-                  <a:prstDash val="solid"/>
-                </a:ln>
-                <a:solidFill>
-                  <a:srgbClr val="FFFFFF"/>
-                </a:solidFill>
-                <a:effectLst>
-                  <a:outerShdw blurRad="38100" dist="22860" dir="5400000" algn="tl" rotWithShape="0">
-                    <a:srgbClr val="000000">
-                      <a:alpha val="30000"/>
-                    </a:srgbClr>
-                  </a:outerShdw>
-                </a:effectLst>
-                <a:latin typeface="Roboto" panose="020F0502020204030204" pitchFamily="2" charset="0"/>
-              </a:rPr>
-              <a:t> </a:t>
-            </a:r>
-            <a:r>
-              <a:rPr lang="en-DE" b="1" dirty="0" err="1">
-                <a:ln w="10160">
-                  <a:solidFill>
-                    <a:schemeClr val="tx1"/>
-                  </a:solidFill>
-                  <a:prstDash val="solid"/>
-                </a:ln>
-                <a:solidFill>
-                  <a:srgbClr val="FFFFFF"/>
-                </a:solidFill>
-                <a:effectLst>
-                  <a:outerShdw blurRad="38100" dist="22860" dir="5400000" algn="tl" rotWithShape="0">
-                    <a:srgbClr val="000000">
-                      <a:alpha val="30000"/>
-                    </a:srgbClr>
-                  </a:outerShdw>
-                </a:effectLst>
-                <a:latin typeface="Roboto" panose="020F0502020204030204" pitchFamily="2" charset="0"/>
-              </a:rPr>
-              <a:t>Charakteren</a:t>
-            </a:r>
-            <a:endParaRPr lang="en-DE" b="1" dirty="0">
-              <a:ln w="10160">
-                <a:solidFill>
-                  <a:schemeClr val="tx1"/>
-                </a:solidFill>
-                <a:prstDash val="solid"/>
-              </a:ln>
-              <a:solidFill>
-                <a:srgbClr val="FFFFFF"/>
-              </a:solidFill>
-              <a:effectLst>
-                <a:outerShdw blurRad="38100" dist="22860" dir="5400000" algn="tl" rotWithShape="0">
-                  <a:srgbClr val="000000">
-                    <a:alpha val="30000"/>
-                  </a:srgbClr>
-                </a:outerShdw>
-              </a:effectLst>
-              <a:latin typeface="Roboto" panose="020F0502020204030204" pitchFamily="2" charset="0"/>
-            </a:endParaRPr>
-          </a:p>
-          <a:p>
             <a:endParaRPr lang="en-US" dirty="0"/>
           </a:p>
         </p:txBody>
       </p:sp>
+      <p:pic>
+        <p:nvPicPr>
+          <p:cNvPr id="5" name="Grafik 4">
+            <a:extLst>
+              <a:ext uri="{FF2B5EF4-FFF2-40B4-BE49-F238E27FC236}">
+                <a16:creationId xmlns:a16="http://schemas.microsoft.com/office/drawing/2014/main" id="{AFBC3BF1-AFDB-AF8B-0354-70B3821C9E1D}"/>
+              </a:ext>
+            </a:extLst>
+          </p:cNvPr>
+          <p:cNvPicPr>
+            <a:picLocks noChangeAspect="1"/>
+          </p:cNvPicPr>
+          <p:nvPr/>
+        </p:nvPicPr>
+        <p:blipFill>
+          <a:blip r:embed="rId2"/>
+          <a:stretch>
+            <a:fillRect/>
+          </a:stretch>
+        </p:blipFill>
+        <p:spPr>
+          <a:xfrm>
+            <a:off x="3147600" y="1669377"/>
+            <a:ext cx="5896800" cy="4663833"/>
+          </a:xfrm>
+          <a:prstGeom prst="rect">
+            <a:avLst/>
+          </a:prstGeom>
+        </p:spPr>
+      </p:pic>
     </p:spTree>
     <p:extLst>
       <p:ext uri="{BB962C8B-B14F-4D97-AF65-F5344CB8AC3E}">
-        <p14:creationId xmlns:p14="http://schemas.microsoft.com/office/powerpoint/2010/main" val="3273323767"/>
+        <p14:creationId xmlns:p14="http://schemas.microsoft.com/office/powerpoint/2010/main" val="252629788"/>
       </p:ext>
     </p:extLst>
   </p:cSld>
@@ -17910,6 +17791,896 @@
           <p:cNvPr id="2" name="Titel 1">
             <a:extLst>
               <a:ext uri="{FF2B5EF4-FFF2-40B4-BE49-F238E27FC236}">
+                <a16:creationId xmlns:a16="http://schemas.microsoft.com/office/drawing/2014/main" id="{7E453F76-D25F-44A6-187F-EC95CE5C9795}"/>
+              </a:ext>
+            </a:extLst>
+          </p:cNvPr>
+          <p:cNvSpPr>
+            <a:spLocks noGrp="1"/>
+          </p:cNvSpPr>
+          <p:nvPr>
+            <p:ph type="title"/>
+          </p:nvPr>
+        </p:nvSpPr>
+        <p:spPr/>
+        <p:txBody>
+          <a:bodyPr/>
+          <a:lstStyle/>
+          <a:p>
+            <a:r>
+              <a:rPr lang="en-DE" b="1" dirty="0" err="1">
+                <a:ln w="10160">
+                  <a:solidFill>
+                    <a:schemeClr val="tx1"/>
+                  </a:solidFill>
+                  <a:prstDash val="solid"/>
+                </a:ln>
+                <a:solidFill>
+                  <a:srgbClr val="FFFFFF"/>
+                </a:solidFill>
+                <a:effectLst>
+                  <a:outerShdw blurRad="38100" dist="22860" dir="5400000" algn="tl" rotWithShape="0">
+                    <a:srgbClr val="000000">
+                      <a:alpha val="30000"/>
+                    </a:srgbClr>
+                  </a:outerShdw>
+                </a:effectLst>
+                <a:latin typeface="Roboto" panose="020F0502020204030204" pitchFamily="2" charset="0"/>
+              </a:rPr>
+              <a:t>Visualisierung</a:t>
+            </a:r>
+            <a:r>
+              <a:rPr lang="en-DE" b="1" dirty="0">
+                <a:ln w="10160">
+                  <a:solidFill>
+                    <a:schemeClr val="tx1"/>
+                  </a:solidFill>
+                  <a:prstDash val="solid"/>
+                </a:ln>
+                <a:solidFill>
+                  <a:srgbClr val="FFFFFF"/>
+                </a:solidFill>
+                <a:effectLst>
+                  <a:outerShdw blurRad="38100" dist="22860" dir="5400000" algn="tl" rotWithShape="0">
+                    <a:srgbClr val="000000">
+                      <a:alpha val="30000"/>
+                    </a:srgbClr>
+                  </a:outerShdw>
+                </a:effectLst>
+                <a:latin typeface="Roboto" panose="020F0502020204030204" pitchFamily="2" charset="0"/>
+              </a:rPr>
+              <a:t> der </a:t>
+            </a:r>
+            <a:r>
+              <a:rPr lang="en-DE" b="1" dirty="0" err="1">
+                <a:ln w="10160">
+                  <a:solidFill>
+                    <a:schemeClr val="tx1"/>
+                  </a:solidFill>
+                  <a:prstDash val="solid"/>
+                </a:ln>
+                <a:solidFill>
+                  <a:srgbClr val="FFFFFF"/>
+                </a:solidFill>
+                <a:effectLst>
+                  <a:outerShdw blurRad="38100" dist="22860" dir="5400000" algn="tl" rotWithShape="0">
+                    <a:srgbClr val="000000">
+                      <a:alpha val="30000"/>
+                    </a:srgbClr>
+                  </a:outerShdw>
+                </a:effectLst>
+                <a:latin typeface="Roboto" panose="020F0502020204030204" pitchFamily="2" charset="0"/>
+              </a:rPr>
+              <a:t>Beziehungen</a:t>
+            </a:r>
+            <a:r>
+              <a:rPr lang="en-DE" b="1" dirty="0">
+                <a:ln w="10160">
+                  <a:solidFill>
+                    <a:schemeClr val="tx1"/>
+                  </a:solidFill>
+                  <a:prstDash val="solid"/>
+                </a:ln>
+                <a:solidFill>
+                  <a:srgbClr val="FFFFFF"/>
+                </a:solidFill>
+                <a:effectLst>
+                  <a:outerShdw blurRad="38100" dist="22860" dir="5400000" algn="tl" rotWithShape="0">
+                    <a:srgbClr val="000000">
+                      <a:alpha val="30000"/>
+                    </a:srgbClr>
+                  </a:outerShdw>
+                </a:effectLst>
+                <a:latin typeface="Roboto" panose="020F0502020204030204" pitchFamily="2" charset="0"/>
+              </a:rPr>
+              <a:t> </a:t>
+            </a:r>
+            <a:r>
+              <a:rPr lang="en-DE" b="1" dirty="0" err="1">
+                <a:ln w="10160">
+                  <a:solidFill>
+                    <a:schemeClr val="tx1"/>
+                  </a:solidFill>
+                  <a:prstDash val="solid"/>
+                </a:ln>
+                <a:solidFill>
+                  <a:srgbClr val="FFFFFF"/>
+                </a:solidFill>
+                <a:effectLst>
+                  <a:outerShdw blurRad="38100" dist="22860" dir="5400000" algn="tl" rotWithShape="0">
+                    <a:srgbClr val="000000">
+                      <a:alpha val="30000"/>
+                    </a:srgbClr>
+                  </a:outerShdw>
+                </a:effectLst>
+                <a:latin typeface="Roboto" panose="020F0502020204030204" pitchFamily="2" charset="0"/>
+              </a:rPr>
+              <a:t>mit</a:t>
+            </a:r>
+            <a:r>
+              <a:rPr lang="en-DE" b="1" dirty="0">
+                <a:ln w="10160">
+                  <a:solidFill>
+                    <a:schemeClr val="tx1"/>
+                  </a:solidFill>
+                  <a:prstDash val="solid"/>
+                </a:ln>
+                <a:solidFill>
+                  <a:srgbClr val="FFFFFF"/>
+                </a:solidFill>
+                <a:effectLst>
+                  <a:outerShdw blurRad="38100" dist="22860" dir="5400000" algn="tl" rotWithShape="0">
+                    <a:srgbClr val="000000">
+                      <a:alpha val="30000"/>
+                    </a:srgbClr>
+                  </a:outerShdw>
+                </a:effectLst>
+                <a:latin typeface="Roboto" panose="020F0502020204030204" pitchFamily="2" charset="0"/>
+              </a:rPr>
+              <a:t> </a:t>
+            </a:r>
+            <a:r>
+              <a:rPr lang="en-DE" b="1" dirty="0" err="1">
+                <a:ln w="10160">
+                  <a:solidFill>
+                    <a:schemeClr val="tx1"/>
+                  </a:solidFill>
+                  <a:prstDash val="solid"/>
+                </a:ln>
+                <a:solidFill>
+                  <a:srgbClr val="FFFFFF"/>
+                </a:solidFill>
+                <a:effectLst>
+                  <a:outerShdw blurRad="38100" dist="22860" dir="5400000" algn="tl" rotWithShape="0">
+                    <a:srgbClr val="000000">
+                      <a:alpha val="30000"/>
+                    </a:srgbClr>
+                  </a:outerShdw>
+                </a:effectLst>
+                <a:latin typeface="Roboto" panose="020F0502020204030204" pitchFamily="2" charset="0"/>
+              </a:rPr>
+              <a:t>NetworkX</a:t>
+            </a:r>
+            <a:endParaRPr lang="en-US" dirty="0"/>
+          </a:p>
+        </p:txBody>
+      </p:sp>
+      <p:sp>
+        <p:nvSpPr>
+          <p:cNvPr id="3" name="Inhaltsplatzhalter 2">
+            <a:extLst>
+              <a:ext uri="{FF2B5EF4-FFF2-40B4-BE49-F238E27FC236}">
+                <a16:creationId xmlns:a16="http://schemas.microsoft.com/office/drawing/2014/main" id="{20B6C5B2-4636-7856-F985-B9A6A40B06E2}"/>
+              </a:ext>
+            </a:extLst>
+          </p:cNvPr>
+          <p:cNvSpPr>
+            <a:spLocks noGrp="1"/>
+          </p:cNvSpPr>
+          <p:nvPr>
+            <p:ph idx="1"/>
+          </p:nvPr>
+        </p:nvSpPr>
+        <p:spPr/>
+        <p:txBody>
+          <a:bodyPr/>
+          <a:lstStyle/>
+          <a:p>
+            <a:endParaRPr lang="en-US" dirty="0"/>
+          </a:p>
+        </p:txBody>
+      </p:sp>
+      <p:pic>
+        <p:nvPicPr>
+          <p:cNvPr id="6" name="Grafik 5">
+            <a:extLst>
+              <a:ext uri="{FF2B5EF4-FFF2-40B4-BE49-F238E27FC236}">
+                <a16:creationId xmlns:a16="http://schemas.microsoft.com/office/drawing/2014/main" id="{3F0AF263-5441-0FD0-54E1-3CB2560AA3CA}"/>
+              </a:ext>
+            </a:extLst>
+          </p:cNvPr>
+          <p:cNvPicPr>
+            <a:picLocks noChangeAspect="1"/>
+          </p:cNvPicPr>
+          <p:nvPr/>
+        </p:nvPicPr>
+        <p:blipFill>
+          <a:blip r:embed="rId2"/>
+          <a:stretch>
+            <a:fillRect/>
+          </a:stretch>
+        </p:blipFill>
+        <p:spPr>
+          <a:xfrm>
+            <a:off x="3147600" y="1669377"/>
+            <a:ext cx="5896800" cy="4663833"/>
+          </a:xfrm>
+          <a:prstGeom prst="rect">
+            <a:avLst/>
+          </a:prstGeom>
+        </p:spPr>
+      </p:pic>
+    </p:spTree>
+    <p:extLst>
+      <p:ext uri="{BB962C8B-B14F-4D97-AF65-F5344CB8AC3E}">
+        <p14:creationId xmlns:p14="http://schemas.microsoft.com/office/powerpoint/2010/main" val="3642997238"/>
+      </p:ext>
+    </p:extLst>
+  </p:cSld>
+  <p:clrMapOvr>
+    <a:masterClrMapping/>
+  </p:clrMapOvr>
+</p:sld>
+</file>
+
+<file path=ppt/slides/slide41.xml><?xml version="1.0" encoding="utf-8"?>
+<p:sld xmlns:a="http://schemas.openxmlformats.org/drawingml/2006/main" xmlns:r="http://schemas.openxmlformats.org/officeDocument/2006/relationships" xmlns:p="http://schemas.openxmlformats.org/presentationml/2006/main">
+  <p:cSld>
+    <p:spTree>
+      <p:nvGrpSpPr>
+        <p:cNvPr id="1" name=""/>
+        <p:cNvGrpSpPr/>
+        <p:nvPr/>
+      </p:nvGrpSpPr>
+      <p:grpSpPr>
+        <a:xfrm>
+          <a:off x="0" y="0"/>
+          <a:ext cx="0" cy="0"/>
+          <a:chOff x="0" y="0"/>
+          <a:chExt cx="0" cy="0"/>
+        </a:xfrm>
+      </p:grpSpPr>
+      <p:sp>
+        <p:nvSpPr>
+          <p:cNvPr id="2" name="Titel 1">
+            <a:extLst>
+              <a:ext uri="{FF2B5EF4-FFF2-40B4-BE49-F238E27FC236}">
+                <a16:creationId xmlns:a16="http://schemas.microsoft.com/office/drawing/2014/main" id="{74739D04-C314-DD4D-9BA5-6BA75D2C249A}"/>
+              </a:ext>
+            </a:extLst>
+          </p:cNvPr>
+          <p:cNvSpPr>
+            <a:spLocks noGrp="1"/>
+          </p:cNvSpPr>
+          <p:nvPr>
+            <p:ph type="ctrTitle"/>
+          </p:nvPr>
+        </p:nvSpPr>
+        <p:spPr/>
+        <p:txBody>
+          <a:bodyPr/>
+          <a:lstStyle/>
+          <a:p>
+            <a:endParaRPr lang="en-US"/>
+          </a:p>
+        </p:txBody>
+      </p:sp>
+      <p:sp>
+        <p:nvSpPr>
+          <p:cNvPr id="3" name="Untertitel 2">
+            <a:extLst>
+              <a:ext uri="{FF2B5EF4-FFF2-40B4-BE49-F238E27FC236}">
+                <a16:creationId xmlns:a16="http://schemas.microsoft.com/office/drawing/2014/main" id="{4E1EA583-A44B-6915-8A67-90EC70958F07}"/>
+              </a:ext>
+            </a:extLst>
+          </p:cNvPr>
+          <p:cNvSpPr>
+            <a:spLocks noGrp="1"/>
+          </p:cNvSpPr>
+          <p:nvPr>
+            <p:ph type="subTitle" idx="1"/>
+          </p:nvPr>
+        </p:nvSpPr>
+        <p:spPr/>
+        <p:txBody>
+          <a:bodyPr/>
+          <a:lstStyle/>
+          <a:p>
+            <a:endParaRPr lang="en-US"/>
+          </a:p>
+        </p:txBody>
+      </p:sp>
+      <p:pic>
+        <p:nvPicPr>
+          <p:cNvPr id="3074" name="Picture 2" descr="Spider-Man vs Wolverine Finally Gets a Definitive Answer">
+            <a:extLst>
+              <a:ext uri="{FF2B5EF4-FFF2-40B4-BE49-F238E27FC236}">
+                <a16:creationId xmlns:a16="http://schemas.microsoft.com/office/drawing/2014/main" id="{8426E9E2-FA32-9C53-D3E3-6FA7D87DFD80}"/>
+              </a:ext>
+            </a:extLst>
+          </p:cNvPr>
+          <p:cNvPicPr>
+            <a:picLocks noChangeAspect="1" noChangeArrowheads="1"/>
+          </p:cNvPicPr>
+          <p:nvPr/>
+        </p:nvPicPr>
+        <p:blipFill>
+          <a:blip r:embed="rId2">
+            <a:extLst>
+              <a:ext uri="{28A0092B-C50C-407E-A947-70E740481C1C}">
+                <a14:useLocalDpi xmlns:a14="http://schemas.microsoft.com/office/drawing/2010/main" val="0"/>
+              </a:ext>
+            </a:extLst>
+          </a:blip>
+          <a:srcRect/>
+          <a:stretch>
+            <a:fillRect/>
+          </a:stretch>
+        </p:blipFill>
+        <p:spPr bwMode="auto">
+          <a:xfrm>
+            <a:off x="2205037" y="1483518"/>
+            <a:ext cx="7781926" cy="3890963"/>
+          </a:xfrm>
+          <a:prstGeom prst="rect">
+            <a:avLst/>
+          </a:prstGeom>
+          <a:noFill/>
+          <a:extLst>
+            <a:ext uri="{909E8E84-426E-40DD-AFC4-6F175D3DCCD1}">
+              <a14:hiddenFill xmlns:a14="http://schemas.microsoft.com/office/drawing/2010/main">
+                <a:solidFill>
+                  <a:srgbClr val="FFFFFF"/>
+                </a:solidFill>
+              </a14:hiddenFill>
+            </a:ext>
+          </a:extLst>
+        </p:spPr>
+      </p:pic>
+    </p:spTree>
+    <p:extLst>
+      <p:ext uri="{BB962C8B-B14F-4D97-AF65-F5344CB8AC3E}">
+        <p14:creationId xmlns:p14="http://schemas.microsoft.com/office/powerpoint/2010/main" val="3125972572"/>
+      </p:ext>
+    </p:extLst>
+  </p:cSld>
+  <p:clrMapOvr>
+    <a:masterClrMapping/>
+  </p:clrMapOvr>
+</p:sld>
+</file>
+
+<file path=ppt/slides/slide42.xml><?xml version="1.0" encoding="utf-8"?>
+<p:sld xmlns:a="http://schemas.openxmlformats.org/drawingml/2006/main" xmlns:r="http://schemas.openxmlformats.org/officeDocument/2006/relationships" xmlns:p="http://schemas.openxmlformats.org/presentationml/2006/main">
+  <p:cSld>
+    <p:spTree>
+      <p:nvGrpSpPr>
+        <p:cNvPr id="1" name=""/>
+        <p:cNvGrpSpPr/>
+        <p:nvPr/>
+      </p:nvGrpSpPr>
+      <p:grpSpPr>
+        <a:xfrm>
+          <a:off x="0" y="0"/>
+          <a:ext cx="0" cy="0"/>
+          <a:chOff x="0" y="0"/>
+          <a:chExt cx="0" cy="0"/>
+        </a:xfrm>
+      </p:grpSpPr>
+      <p:sp>
+        <p:nvSpPr>
+          <p:cNvPr id="2" name="Titel 1">
+            <a:extLst>
+              <a:ext uri="{FF2B5EF4-FFF2-40B4-BE49-F238E27FC236}">
+                <a16:creationId xmlns:a16="http://schemas.microsoft.com/office/drawing/2014/main" id="{05EBC575-35D8-BAA2-4ACE-52C845C31B7C}"/>
+              </a:ext>
+            </a:extLst>
+          </p:cNvPr>
+          <p:cNvSpPr>
+            <a:spLocks noGrp="1"/>
+          </p:cNvSpPr>
+          <p:nvPr>
+            <p:ph type="title"/>
+          </p:nvPr>
+        </p:nvSpPr>
+        <p:spPr/>
+        <p:txBody>
+          <a:bodyPr/>
+          <a:lstStyle/>
+          <a:p>
+            <a:r>
+              <a:rPr lang="en-DE" b="1" dirty="0" err="1">
+                <a:ln w="10160">
+                  <a:solidFill>
+                    <a:schemeClr val="tx1"/>
+                  </a:solidFill>
+                  <a:prstDash val="solid"/>
+                </a:ln>
+                <a:solidFill>
+                  <a:srgbClr val="FFFFFF"/>
+                </a:solidFill>
+                <a:effectLst>
+                  <a:outerShdw blurRad="38100" dist="22860" dir="5400000" algn="tl" rotWithShape="0">
+                    <a:srgbClr val="000000">
+                      <a:alpha val="30000"/>
+                    </a:srgbClr>
+                  </a:outerShdw>
+                </a:effectLst>
+                <a:latin typeface="Roboto" panose="020F0502020204030204" pitchFamily="2" charset="0"/>
+              </a:rPr>
+              <a:t>Conclusio</a:t>
+            </a:r>
+            <a:endParaRPr lang="en-US" dirty="0"/>
+          </a:p>
+        </p:txBody>
+      </p:sp>
+      <p:sp>
+        <p:nvSpPr>
+          <p:cNvPr id="3" name="Inhaltsplatzhalter 2">
+            <a:extLst>
+              <a:ext uri="{FF2B5EF4-FFF2-40B4-BE49-F238E27FC236}">
+                <a16:creationId xmlns:a16="http://schemas.microsoft.com/office/drawing/2014/main" id="{9DD7EA35-CDDE-C5F7-A931-6F63FE3E18E2}"/>
+              </a:ext>
+            </a:extLst>
+          </p:cNvPr>
+          <p:cNvSpPr>
+            <a:spLocks noGrp="1"/>
+          </p:cNvSpPr>
+          <p:nvPr>
+            <p:ph idx="1"/>
+          </p:nvPr>
+        </p:nvSpPr>
+        <p:spPr/>
+        <p:txBody>
+          <a:bodyPr/>
+          <a:lstStyle/>
+          <a:p>
+            <a:r>
+              <a:rPr lang="en-DE" b="1" dirty="0">
+                <a:ln w="10160">
+                  <a:solidFill>
+                    <a:schemeClr val="tx1"/>
+                  </a:solidFill>
+                  <a:prstDash val="solid"/>
+                </a:ln>
+                <a:solidFill>
+                  <a:srgbClr val="FFFFFF"/>
+                </a:solidFill>
+                <a:effectLst>
+                  <a:outerShdw blurRad="38100" dist="22860" dir="5400000" algn="tl" rotWithShape="0">
+                    <a:srgbClr val="000000">
+                      <a:alpha val="30000"/>
+                    </a:srgbClr>
+                  </a:outerShdw>
+                </a:effectLst>
+                <a:latin typeface="Roboto" panose="020F0502020204030204" pitchFamily="2" charset="0"/>
+              </a:rPr>
+              <a:t>Spider-Man und X-Men </a:t>
+            </a:r>
+            <a:r>
+              <a:rPr lang="en-DE" b="1" dirty="0" err="1">
+                <a:ln w="10160">
+                  <a:solidFill>
+                    <a:schemeClr val="tx1"/>
+                  </a:solidFill>
+                  <a:prstDash val="solid"/>
+                </a:ln>
+                <a:solidFill>
+                  <a:srgbClr val="FFFFFF"/>
+                </a:solidFill>
+                <a:effectLst>
+                  <a:outerShdw blurRad="38100" dist="22860" dir="5400000" algn="tl" rotWithShape="0">
+                    <a:srgbClr val="000000">
+                      <a:alpha val="30000"/>
+                    </a:srgbClr>
+                  </a:outerShdw>
+                </a:effectLst>
+                <a:latin typeface="Roboto" panose="020F0502020204030204" pitchFamily="2" charset="0"/>
+              </a:rPr>
+              <a:t>bleiben</a:t>
+            </a:r>
+            <a:r>
+              <a:rPr lang="en-DE" b="1" dirty="0">
+                <a:ln w="10160">
+                  <a:solidFill>
+                    <a:schemeClr val="tx1"/>
+                  </a:solidFill>
+                  <a:prstDash val="solid"/>
+                </a:ln>
+                <a:solidFill>
+                  <a:srgbClr val="FFFFFF"/>
+                </a:solidFill>
+                <a:effectLst>
+                  <a:outerShdw blurRad="38100" dist="22860" dir="5400000" algn="tl" rotWithShape="0">
+                    <a:srgbClr val="000000">
+                      <a:alpha val="30000"/>
+                    </a:srgbClr>
+                  </a:outerShdw>
+                </a:effectLst>
+                <a:latin typeface="Roboto" panose="020F0502020204030204" pitchFamily="2" charset="0"/>
+              </a:rPr>
+              <a:t> die </a:t>
+            </a:r>
+            <a:r>
+              <a:rPr lang="en-DE" b="1" dirty="0" err="1">
+                <a:ln w="10160">
+                  <a:solidFill>
+                    <a:schemeClr val="tx1"/>
+                  </a:solidFill>
+                  <a:prstDash val="solid"/>
+                </a:ln>
+                <a:solidFill>
+                  <a:srgbClr val="FFFFFF"/>
+                </a:solidFill>
+                <a:effectLst>
+                  <a:outerShdw blurRad="38100" dist="22860" dir="5400000" algn="tl" rotWithShape="0">
+                    <a:srgbClr val="000000">
+                      <a:alpha val="30000"/>
+                    </a:srgbClr>
+                  </a:outerShdw>
+                </a:effectLst>
+                <a:latin typeface="Roboto" panose="020F0502020204030204" pitchFamily="2" charset="0"/>
+              </a:rPr>
+              <a:t>populärsten</a:t>
+            </a:r>
+            <a:r>
+              <a:rPr lang="en-DE" b="1" dirty="0">
+                <a:ln w="10160">
+                  <a:solidFill>
+                    <a:schemeClr val="tx1"/>
+                  </a:solidFill>
+                  <a:prstDash val="solid"/>
+                </a:ln>
+                <a:solidFill>
+                  <a:srgbClr val="FFFFFF"/>
+                </a:solidFill>
+                <a:effectLst>
+                  <a:outerShdw blurRad="38100" dist="22860" dir="5400000" algn="tl" rotWithShape="0">
+                    <a:srgbClr val="000000">
+                      <a:alpha val="30000"/>
+                    </a:srgbClr>
+                  </a:outerShdw>
+                </a:effectLst>
+                <a:latin typeface="Roboto" panose="020F0502020204030204" pitchFamily="2" charset="0"/>
+              </a:rPr>
+              <a:t> </a:t>
+            </a:r>
+            <a:r>
+              <a:rPr lang="en-DE" b="1" dirty="0" err="1">
+                <a:ln w="10160">
+                  <a:solidFill>
+                    <a:schemeClr val="tx1"/>
+                  </a:solidFill>
+                  <a:prstDash val="solid"/>
+                </a:ln>
+                <a:solidFill>
+                  <a:srgbClr val="FFFFFF"/>
+                </a:solidFill>
+                <a:effectLst>
+                  <a:outerShdw blurRad="38100" dist="22860" dir="5400000" algn="tl" rotWithShape="0">
+                    <a:srgbClr val="000000">
+                      <a:alpha val="30000"/>
+                    </a:srgbClr>
+                  </a:outerShdw>
+                </a:effectLst>
+                <a:latin typeface="Roboto" panose="020F0502020204030204" pitchFamily="2" charset="0"/>
+              </a:rPr>
+              <a:t>Charaktere</a:t>
+            </a:r>
+            <a:endParaRPr lang="en-DE" b="1" dirty="0">
+              <a:ln w="10160">
+                <a:solidFill>
+                  <a:schemeClr val="tx1"/>
+                </a:solidFill>
+                <a:prstDash val="solid"/>
+              </a:ln>
+              <a:solidFill>
+                <a:srgbClr val="FFFFFF"/>
+              </a:solidFill>
+              <a:effectLst>
+                <a:outerShdw blurRad="38100" dist="22860" dir="5400000" algn="tl" rotWithShape="0">
+                  <a:srgbClr val="000000">
+                    <a:alpha val="30000"/>
+                  </a:srgbClr>
+                </a:outerShdw>
+              </a:effectLst>
+              <a:latin typeface="Roboto" panose="020F0502020204030204" pitchFamily="2" charset="0"/>
+            </a:endParaRPr>
+          </a:p>
+          <a:p>
+            <a:r>
+              <a:rPr lang="en-DE" b="1" dirty="0">
+                <a:ln w="10160">
+                  <a:solidFill>
+                    <a:schemeClr val="tx1"/>
+                  </a:solidFill>
+                  <a:prstDash val="solid"/>
+                </a:ln>
+                <a:solidFill>
+                  <a:srgbClr val="FFFFFF"/>
+                </a:solidFill>
+                <a:effectLst>
+                  <a:outerShdw blurRad="38100" dist="22860" dir="5400000" algn="tl" rotWithShape="0">
+                    <a:srgbClr val="000000">
+                      <a:alpha val="30000"/>
+                    </a:srgbClr>
+                  </a:outerShdw>
+                </a:effectLst>
+                <a:latin typeface="Roboto" panose="020F0502020204030204" pitchFamily="2" charset="0"/>
+              </a:rPr>
+              <a:t>X-Men </a:t>
+            </a:r>
+            <a:r>
+              <a:rPr lang="en-DE" b="1" dirty="0" err="1">
+                <a:ln w="10160">
+                  <a:solidFill>
+                    <a:schemeClr val="tx1"/>
+                  </a:solidFill>
+                  <a:prstDash val="solid"/>
+                </a:ln>
+                <a:solidFill>
+                  <a:srgbClr val="FFFFFF"/>
+                </a:solidFill>
+                <a:effectLst>
+                  <a:outerShdw blurRad="38100" dist="22860" dir="5400000" algn="tl" rotWithShape="0">
+                    <a:srgbClr val="000000">
+                      <a:alpha val="30000"/>
+                    </a:srgbClr>
+                  </a:outerShdw>
+                </a:effectLst>
+                <a:latin typeface="Roboto" panose="020F0502020204030204" pitchFamily="2" charset="0"/>
+              </a:rPr>
+              <a:t>dominieren</a:t>
+            </a:r>
+            <a:r>
+              <a:rPr lang="en-DE" b="1" dirty="0">
+                <a:ln w="10160">
+                  <a:solidFill>
+                    <a:schemeClr val="tx1"/>
+                  </a:solidFill>
+                  <a:prstDash val="solid"/>
+                </a:ln>
+                <a:solidFill>
+                  <a:srgbClr val="FFFFFF"/>
+                </a:solidFill>
+                <a:effectLst>
+                  <a:outerShdw blurRad="38100" dist="22860" dir="5400000" algn="tl" rotWithShape="0">
+                    <a:srgbClr val="000000">
+                      <a:alpha val="30000"/>
+                    </a:srgbClr>
+                  </a:outerShdw>
+                </a:effectLst>
+                <a:latin typeface="Roboto" panose="020F0502020204030204" pitchFamily="2" charset="0"/>
+              </a:rPr>
+              <a:t> in den </a:t>
+            </a:r>
+            <a:r>
+              <a:rPr lang="en-DE" b="1" dirty="0" err="1">
+                <a:ln w="10160">
+                  <a:solidFill>
+                    <a:schemeClr val="tx1"/>
+                  </a:solidFill>
+                  <a:prstDash val="solid"/>
+                </a:ln>
+                <a:solidFill>
+                  <a:srgbClr val="FFFFFF"/>
+                </a:solidFill>
+                <a:effectLst>
+                  <a:outerShdw blurRad="38100" dist="22860" dir="5400000" algn="tl" rotWithShape="0">
+                    <a:srgbClr val="000000">
+                      <a:alpha val="30000"/>
+                    </a:srgbClr>
+                  </a:outerShdw>
+                </a:effectLst>
+                <a:latin typeface="Roboto" panose="020F0502020204030204" pitchFamily="2" charset="0"/>
+              </a:rPr>
+              <a:t>Beziehungen</a:t>
+            </a:r>
+            <a:r>
+              <a:rPr lang="en-DE" b="1" dirty="0">
+                <a:ln w="10160">
+                  <a:solidFill>
+                    <a:schemeClr val="tx1"/>
+                  </a:solidFill>
+                  <a:prstDash val="solid"/>
+                </a:ln>
+                <a:solidFill>
+                  <a:srgbClr val="FFFFFF"/>
+                </a:solidFill>
+                <a:effectLst>
+                  <a:outerShdw blurRad="38100" dist="22860" dir="5400000" algn="tl" rotWithShape="0">
+                    <a:srgbClr val="000000">
+                      <a:alpha val="30000"/>
+                    </a:srgbClr>
+                  </a:outerShdw>
+                </a:effectLst>
+                <a:latin typeface="Roboto" panose="020F0502020204030204" pitchFamily="2" charset="0"/>
+              </a:rPr>
+              <a:t> </a:t>
+            </a:r>
+            <a:r>
+              <a:rPr lang="en-DE" b="1" dirty="0" err="1">
+                <a:ln w="10160">
+                  <a:solidFill>
+                    <a:schemeClr val="tx1"/>
+                  </a:solidFill>
+                  <a:prstDash val="solid"/>
+                </a:ln>
+                <a:solidFill>
+                  <a:srgbClr val="FFFFFF"/>
+                </a:solidFill>
+                <a:effectLst>
+                  <a:outerShdw blurRad="38100" dist="22860" dir="5400000" algn="tl" rotWithShape="0">
+                    <a:srgbClr val="000000">
+                      <a:alpha val="30000"/>
+                    </a:srgbClr>
+                  </a:outerShdw>
+                </a:effectLst>
+                <a:latin typeface="Roboto" panose="020F0502020204030204" pitchFamily="2" charset="0"/>
+              </a:rPr>
+              <a:t>mit</a:t>
+            </a:r>
+            <a:r>
+              <a:rPr lang="en-DE" b="1" dirty="0">
+                <a:ln w="10160">
+                  <a:solidFill>
+                    <a:schemeClr val="tx1"/>
+                  </a:solidFill>
+                  <a:prstDash val="solid"/>
+                </a:ln>
+                <a:solidFill>
+                  <a:srgbClr val="FFFFFF"/>
+                </a:solidFill>
+                <a:effectLst>
+                  <a:outerShdw blurRad="38100" dist="22860" dir="5400000" algn="tl" rotWithShape="0">
+                    <a:srgbClr val="000000">
+                      <a:alpha val="30000"/>
+                    </a:srgbClr>
+                  </a:outerShdw>
+                </a:effectLst>
+                <a:latin typeface="Roboto" panose="020F0502020204030204" pitchFamily="2" charset="0"/>
+              </a:rPr>
+              <a:t> </a:t>
+            </a:r>
+            <a:r>
+              <a:rPr lang="en-DE" b="1" dirty="0" err="1">
+                <a:ln w="10160">
+                  <a:solidFill>
+                    <a:schemeClr val="tx1"/>
+                  </a:solidFill>
+                  <a:prstDash val="solid"/>
+                </a:ln>
+                <a:solidFill>
+                  <a:srgbClr val="FFFFFF"/>
+                </a:solidFill>
+                <a:effectLst>
+                  <a:outerShdw blurRad="38100" dist="22860" dir="5400000" algn="tl" rotWithShape="0">
+                    <a:srgbClr val="000000">
+                      <a:alpha val="30000"/>
+                    </a:srgbClr>
+                  </a:outerShdw>
+                </a:effectLst>
+                <a:latin typeface="Roboto" panose="020F0502020204030204" pitchFamily="2" charset="0"/>
+              </a:rPr>
+              <a:t>anderen</a:t>
+            </a:r>
+            <a:r>
+              <a:rPr lang="en-DE" b="1" dirty="0">
+                <a:ln w="10160">
+                  <a:solidFill>
+                    <a:schemeClr val="tx1"/>
+                  </a:solidFill>
+                  <a:prstDash val="solid"/>
+                </a:ln>
+                <a:solidFill>
+                  <a:srgbClr val="FFFFFF"/>
+                </a:solidFill>
+                <a:effectLst>
+                  <a:outerShdw blurRad="38100" dist="22860" dir="5400000" algn="tl" rotWithShape="0">
+                    <a:srgbClr val="000000">
+                      <a:alpha val="30000"/>
+                    </a:srgbClr>
+                  </a:outerShdw>
+                </a:effectLst>
+                <a:latin typeface="Roboto" panose="020F0502020204030204" pitchFamily="2" charset="0"/>
+              </a:rPr>
+              <a:t> </a:t>
+            </a:r>
+            <a:r>
+              <a:rPr lang="en-DE" b="1" dirty="0" err="1">
+                <a:ln w="10160">
+                  <a:solidFill>
+                    <a:schemeClr val="tx1"/>
+                  </a:solidFill>
+                  <a:prstDash val="solid"/>
+                </a:ln>
+                <a:solidFill>
+                  <a:srgbClr val="FFFFFF"/>
+                </a:solidFill>
+                <a:effectLst>
+                  <a:outerShdw blurRad="38100" dist="22860" dir="5400000" algn="tl" rotWithShape="0">
+                    <a:srgbClr val="000000">
+                      <a:alpha val="30000"/>
+                    </a:srgbClr>
+                  </a:outerShdw>
+                </a:effectLst>
+                <a:latin typeface="Roboto" panose="020F0502020204030204" pitchFamily="2" charset="0"/>
+              </a:rPr>
+              <a:t>Charakteren</a:t>
+            </a:r>
+            <a:r>
+              <a:rPr lang="en-DE" b="1" dirty="0">
+                <a:ln w="10160">
+                  <a:solidFill>
+                    <a:schemeClr val="tx1"/>
+                  </a:solidFill>
+                  <a:prstDash val="solid"/>
+                </a:ln>
+                <a:solidFill>
+                  <a:srgbClr val="FFFFFF"/>
+                </a:solidFill>
+                <a:effectLst>
+                  <a:outerShdw blurRad="38100" dist="22860" dir="5400000" algn="tl" rotWithShape="0">
+                    <a:srgbClr val="000000">
+                      <a:alpha val="30000"/>
+                    </a:srgbClr>
+                  </a:outerShdw>
+                </a:effectLst>
+                <a:latin typeface="Roboto" panose="020F0502020204030204" pitchFamily="2" charset="0"/>
+              </a:rPr>
+              <a:t> in Events</a:t>
+            </a:r>
+          </a:p>
+          <a:p>
+            <a:endParaRPr lang="en-US" dirty="0"/>
+          </a:p>
+        </p:txBody>
+      </p:sp>
+    </p:spTree>
+    <p:extLst>
+      <p:ext uri="{BB962C8B-B14F-4D97-AF65-F5344CB8AC3E}">
+        <p14:creationId xmlns:p14="http://schemas.microsoft.com/office/powerpoint/2010/main" val="3273323767"/>
+      </p:ext>
+    </p:extLst>
+  </p:cSld>
+  <p:clrMapOvr>
+    <a:masterClrMapping/>
+  </p:clrMapOvr>
+</p:sld>
+</file>
+
+<file path=ppt/slides/slide43.xml><?xml version="1.0" encoding="utf-8"?>
+<p:sld xmlns:a="http://schemas.openxmlformats.org/drawingml/2006/main" xmlns:r="http://schemas.openxmlformats.org/officeDocument/2006/relationships" xmlns:p="http://schemas.openxmlformats.org/presentationml/2006/main">
+  <p:cSld>
+    <p:spTree>
+      <p:nvGrpSpPr>
+        <p:cNvPr id="1" name=""/>
+        <p:cNvGrpSpPr/>
+        <p:nvPr/>
+      </p:nvGrpSpPr>
+      <p:grpSpPr>
+        <a:xfrm>
+          <a:off x="0" y="0"/>
+          <a:ext cx="0" cy="0"/>
+          <a:chOff x="0" y="0"/>
+          <a:chExt cx="0" cy="0"/>
+        </a:xfrm>
+      </p:grpSpPr>
+      <p:sp>
+        <p:nvSpPr>
+          <p:cNvPr id="2" name="Titel 1">
+            <a:extLst>
+              <a:ext uri="{FF2B5EF4-FFF2-40B4-BE49-F238E27FC236}">
                 <a16:creationId xmlns:a16="http://schemas.microsoft.com/office/drawing/2014/main" id="{E2B1BE97-8BAE-8342-4B63-0E90EC59E04A}"/>
               </a:ext>
             </a:extLst>
@@ -18304,26 +19075,26 @@
               <a:t> </a:t>
             </a:r>
             <a:r>
-              <a:rPr lang="en-DE" b="1" dirty="0" err="1">
-                <a:ln w="10160">
-                  <a:solidFill>
-                    <a:schemeClr val="tx1"/>
-                  </a:solidFill>
-                  <a:prstDash val="solid"/>
-                </a:ln>
-                <a:solidFill>
-                  <a:srgbClr val="FFFFFF"/>
-                </a:solidFill>
-                <a:effectLst>
-                  <a:outerShdw blurRad="38100" dist="22860" dir="5400000" algn="tl" rotWithShape="0">
-                    <a:srgbClr val="000000">
-                      <a:alpha val="30000"/>
-                    </a:srgbClr>
-                  </a:outerShdw>
-                </a:effectLst>
-                <a:latin typeface="Roboto" panose="020F0502020204030204" pitchFamily="2" charset="0"/>
-              </a:rPr>
-              <a:t>Handlunugsstränge</a:t>
+              <a:rPr lang="en-DE" b="1">
+                <a:ln w="10160">
+                  <a:solidFill>
+                    <a:schemeClr val="tx1"/>
+                  </a:solidFill>
+                  <a:prstDash val="solid"/>
+                </a:ln>
+                <a:solidFill>
+                  <a:srgbClr val="FFFFFF"/>
+                </a:solidFill>
+                <a:effectLst>
+                  <a:outerShdw blurRad="38100" dist="22860" dir="5400000" algn="tl" rotWithShape="0">
+                    <a:srgbClr val="000000">
+                      <a:alpha val="30000"/>
+                    </a:srgbClr>
+                  </a:outerShdw>
+                </a:effectLst>
+                <a:latin typeface="Roboto" panose="020F0502020204030204" pitchFamily="2" charset="0"/>
+              </a:rPr>
+              <a:t>Handlungsstränge</a:t>
             </a:r>
             <a:r>
               <a:rPr lang="en-DE" b="1" dirty="0">
@@ -18386,7 +19157,7 @@
 </p:sld>
 </file>
 
-<file path=ppt/slides/slide41.xml><?xml version="1.0" encoding="utf-8"?>
+<file path=ppt/slides/slide44.xml><?xml version="1.0" encoding="utf-8"?>
 <p:sld xmlns:a="http://schemas.openxmlformats.org/drawingml/2006/main" xmlns:r="http://schemas.openxmlformats.org/officeDocument/2006/relationships" xmlns:p="http://schemas.openxmlformats.org/presentationml/2006/main">
   <p:cSld>
     <p:spTree>

</xml_diff>